<commit_message>
Mise à jour du slider. Infrarouge vers NFC
</commit_message>
<xml_diff>
--- a/annexes/slides-VR_Tourism.pptx
+++ b/annexes/slides-VR_Tourism.pptx
@@ -212,7 +212,7 @@
           <a:effectLst/>
           <a:extLst>
             <a:ext uri="{91240B29-F687-4f45-9708-019B960494DF}">
-              <a14:hiddenLine xmlns:a14="http://schemas.microsoft.com/office/drawing/2010/main" xmlns="" w="9525">
+              <a14:hiddenLine xmlns="" xmlns:a14="http://schemas.microsoft.com/office/drawing/2010/main" w="9525">
                 <a:solidFill>
                   <a:srgbClr val="000000"/>
                 </a:solidFill>
@@ -405,7 +405,7 @@
             <a:fld id="{08B9EBBA-996F-894A-B54A-D6246ED52CEA}" type="datetimeFigureOut">
               <a:rPr lang="en-US" dirty="0"/>
               <a:pPr/>
-              <a:t>3/6/2018</a:t>
+              <a:t>3/13/2018</a:t>
             </a:fld>
             <a:endParaRPr lang="en-US" dirty="0"/>
           </a:p>
@@ -720,7 +720,7 @@
             <a:fld id="{18C79C5D-2A6F-F04D-97DA-BEF2467B64E4}" type="datetimeFigureOut">
               <a:rPr lang="en-US" dirty="0"/>
               <a:pPr/>
-              <a:t>3/6/2018</a:t>
+              <a:t>3/13/2018</a:t>
             </a:fld>
             <a:endParaRPr lang="en-US" dirty="0"/>
           </a:p>
@@ -1205,7 +1205,7 @@
             <a:fld id="{8DFA1846-DA80-1C48-A609-854EA85C59AD}" type="datetimeFigureOut">
               <a:rPr lang="en-US" dirty="0"/>
               <a:pPr/>
-              <a:t>3/6/2018</a:t>
+              <a:t>3/13/2018</a:t>
             </a:fld>
             <a:endParaRPr lang="en-US" dirty="0"/>
           </a:p>
@@ -1571,7 +1571,7 @@
             <a:fld id="{FBF54567-0DE4-3F47-BF90-CB84690072F9}" type="datetimeFigureOut">
               <a:rPr lang="en-US" dirty="0"/>
               <a:pPr/>
-              <a:t>3/6/2018</a:t>
+              <a:t>3/13/2018</a:t>
             </a:fld>
             <a:endParaRPr lang="en-US" dirty="0"/>
           </a:p>
@@ -1722,7 +1722,7 @@
           <a:ln/>
           <a:extLst>
             <a:ext uri="{91240B29-F687-4f45-9708-019B960494DF}">
-              <a14:hiddenLine xmlns:a14="http://schemas.microsoft.com/office/drawing/2010/main" xmlns="" w="9525">
+              <a14:hiddenLine xmlns="" xmlns:a14="http://schemas.microsoft.com/office/drawing/2010/main" w="9525">
                 <a:solidFill>
                   <a:srgbClr val="000000"/>
                 </a:solidFill>
@@ -1841,7 +1841,7 @@
             <a:fld id="{C6C52C72-DE31-F449-A4ED-4C594FD91407}" type="datetimeFigureOut">
               <a:rPr lang="en-US" dirty="0"/>
               <a:pPr/>
-              <a:t>3/6/2018</a:t>
+              <a:t>3/13/2018</a:t>
             </a:fld>
             <a:endParaRPr lang="en-US" dirty="0"/>
           </a:p>
@@ -1994,7 +1994,7 @@
           <a:ln/>
           <a:extLst>
             <a:ext uri="{91240B29-F687-4f45-9708-019B960494DF}">
-              <a14:hiddenLine xmlns:a14="http://schemas.microsoft.com/office/drawing/2010/main" xmlns="" w="9525">
+              <a14:hiddenLine xmlns="" xmlns:a14="http://schemas.microsoft.com/office/drawing/2010/main" w="9525">
                 <a:solidFill>
                   <a:srgbClr val="000000"/>
                 </a:solidFill>
@@ -2123,7 +2123,7 @@
             <a:fld id="{ED62726E-379B-B349-9EED-81ED093FA806}" type="datetimeFigureOut">
               <a:rPr lang="en-US" dirty="0"/>
               <a:pPr/>
-              <a:t>3/6/2018</a:t>
+              <a:t>3/13/2018</a:t>
             </a:fld>
             <a:endParaRPr lang="en-US" dirty="0"/>
           </a:p>
@@ -2274,7 +2274,7 @@
           <a:ln/>
           <a:extLst>
             <a:ext uri="{91240B29-F687-4f45-9708-019B960494DF}">
-              <a14:hiddenLine xmlns:a14="http://schemas.microsoft.com/office/drawing/2010/main" xmlns="" w="9525">
+              <a14:hiddenLine xmlns="" xmlns:a14="http://schemas.microsoft.com/office/drawing/2010/main" w="9525">
                 <a:solidFill>
                   <a:srgbClr val="000000"/>
                 </a:solidFill>
@@ -2403,7 +2403,7 @@
             <a:fld id="{9B3A1323-8D79-1946-B0D7-40001CF92E9D}" type="datetimeFigureOut">
               <a:rPr lang="en-US" dirty="0"/>
               <a:pPr/>
-              <a:t>3/6/2018</a:t>
+              <a:t>3/13/2018</a:t>
             </a:fld>
             <a:endParaRPr lang="en-US" dirty="0"/>
           </a:p>
@@ -2743,7 +2743,7 @@
             <a:fld id="{8DFA1846-DA80-1C48-A609-854EA85C59AD}" type="datetimeFigureOut">
               <a:rPr lang="en-US" dirty="0"/>
               <a:pPr/>
-              <a:t>3/6/2018</a:t>
+              <a:t>3/13/2018</a:t>
             </a:fld>
             <a:endParaRPr lang="en-US" dirty="0"/>
           </a:p>
@@ -2894,7 +2894,7 @@
           <a:ln/>
           <a:extLst>
             <a:ext uri="{91240B29-F687-4f45-9708-019B960494DF}">
-              <a14:hiddenLine xmlns:a14="http://schemas.microsoft.com/office/drawing/2010/main" xmlns="" w="9525">
+              <a14:hiddenLine xmlns="" xmlns:a14="http://schemas.microsoft.com/office/drawing/2010/main" w="9525">
                 <a:solidFill>
                   <a:srgbClr val="000000"/>
                 </a:solidFill>
@@ -3079,7 +3079,7 @@
             <a:fld id="{57302355-E14B-8545-A8F8-0FE83CC9D524}" type="datetimeFigureOut">
               <a:rPr lang="en-US" dirty="0"/>
               <a:pPr/>
-              <a:t>3/6/2018</a:t>
+              <a:t>3/13/2018</a:t>
             </a:fld>
             <a:endParaRPr lang="en-US" dirty="0"/>
           </a:p>
@@ -3230,7 +3230,7 @@
           <a:ln/>
           <a:extLst>
             <a:ext uri="{91240B29-F687-4f45-9708-019B960494DF}">
-              <a14:hiddenLine xmlns:a14="http://schemas.microsoft.com/office/drawing/2010/main" xmlns="" w="9525">
+              <a14:hiddenLine xmlns="" xmlns:a14="http://schemas.microsoft.com/office/drawing/2010/main" w="9525">
                 <a:solidFill>
                   <a:srgbClr val="000000"/>
                 </a:solidFill>
@@ -3553,7 +3553,7 @@
             <a:fld id="{02640F58-564D-2B4F-AE67-E407BA4FCF45}" type="datetimeFigureOut">
               <a:rPr lang="en-US" dirty="0"/>
               <a:pPr/>
-              <a:t>3/6/2018</a:t>
+              <a:t>3/13/2018</a:t>
             </a:fld>
             <a:endParaRPr lang="en-US" dirty="0"/>
           </a:p>
@@ -3704,7 +3704,7 @@
           <a:ln/>
           <a:extLst>
             <a:ext uri="{91240B29-F687-4f45-9708-019B960494DF}">
-              <a14:hiddenLine xmlns:a14="http://schemas.microsoft.com/office/drawing/2010/main" xmlns="" w="9525">
+              <a14:hiddenLine xmlns="" xmlns:a14="http://schemas.microsoft.com/office/drawing/2010/main" w="9525">
                 <a:solidFill>
                   <a:srgbClr val="000000"/>
                 </a:solidFill>
@@ -3771,7 +3771,7 @@
             <a:fld id="{F13A34C8-038E-2045-AF43-DF7DBB8E0E9E}" type="datetimeFigureOut">
               <a:rPr lang="en-US" dirty="0"/>
               <a:pPr/>
-              <a:t>3/6/2018</a:t>
+              <a:t>3/13/2018</a:t>
             </a:fld>
             <a:endParaRPr lang="en-US" dirty="0"/>
           </a:p>
@@ -3863,7 +3863,7 @@
             <a:fld id="{8818C68F-D26B-8F47-958C-23B49CF8A634}" type="datetimeFigureOut">
               <a:rPr lang="en-US" dirty="0"/>
               <a:pPr/>
-              <a:t>3/6/2018</a:t>
+              <a:t>3/13/2018</a:t>
             </a:fld>
             <a:endParaRPr lang="en-US" dirty="0"/>
           </a:p>
@@ -4127,7 +4127,7 @@
           <a:ln/>
           <a:extLst>
             <a:ext uri="{91240B29-F687-4f45-9708-019B960494DF}">
-              <a14:hiddenLine xmlns:a14="http://schemas.microsoft.com/office/drawing/2010/main" xmlns="" w="9525">
+              <a14:hiddenLine xmlns="" xmlns:a14="http://schemas.microsoft.com/office/drawing/2010/main" w="9525">
                 <a:solidFill>
                   <a:srgbClr val="000000"/>
                 </a:solidFill>
@@ -4327,7 +4327,7 @@
             <a:fld id="{D0DF5E60-9974-AC48-9591-99C2BB44B7CF}" type="datetimeFigureOut">
               <a:rPr lang="en-US" dirty="0"/>
               <a:pPr/>
-              <a:t>3/6/2018</a:t>
+              <a:t>3/13/2018</a:t>
             </a:fld>
             <a:endParaRPr lang="en-US" dirty="0"/>
           </a:p>
@@ -4637,7 +4637,7 @@
             <a:fld id="{18C79C5D-2A6F-F04D-97DA-BEF2467B64E4}" type="datetimeFigureOut">
               <a:rPr lang="en-US" dirty="0"/>
               <a:pPr/>
-              <a:t>3/6/2018</a:t>
+              <a:t>3/13/2018</a:t>
             </a:fld>
             <a:endParaRPr lang="en-US" dirty="0"/>
           </a:p>
@@ -4904,7 +4904,7 @@
             <a:fld id="{09B482E8-6E0E-1B4F-B1FD-C69DB9E858D9}" type="datetimeFigureOut">
               <a:rPr lang="en-US" dirty="0"/>
               <a:pPr/>
-              <a:t>3/6/2018</a:t>
+              <a:t>3/13/2018</a:t>
             </a:fld>
             <a:endParaRPr lang="en-US" dirty="0"/>
           </a:p>
@@ -5935,8 +5935,21 @@
             <a:pPr lvl="1"/>
             <a:r>
               <a:rPr lang="fr-FR" dirty="0" smtClean="0"/>
-              <a:t>Mise en place / Programmation des transmetteurs IR (Infrarouge)</a:t>
-            </a:r>
+              <a:t>Mise en </a:t>
+            </a:r>
+            <a:r>
+              <a:rPr lang="fr-FR" dirty="0" smtClean="0"/>
+              <a:t>place de l’architecture via </a:t>
+            </a:r>
+            <a:r>
+              <a:rPr lang="fr-FR" dirty="0" smtClean="0"/>
+              <a:t>le </a:t>
+            </a:r>
+            <a:r>
+              <a:rPr lang="fr-FR" dirty="0" smtClean="0"/>
+              <a:t>NFC.</a:t>
+            </a:r>
+            <a:endParaRPr lang="fr-FR" dirty="0" smtClean="0"/>
           </a:p>
           <a:p>
             <a:r>
@@ -5960,15 +5973,11 @@
             <a:pPr lvl="1"/>
             <a:r>
               <a:rPr lang="fr-FR" dirty="0" smtClean="0"/>
-              <a:t>Programmation du Web </a:t>
+              <a:t>Programmation du Web Service et base de </a:t>
             </a:r>
             <a:r>
               <a:rPr lang="fr-FR" dirty="0" smtClean="0"/>
-              <a:t>Service et base </a:t>
-            </a:r>
-            <a:r>
-              <a:rPr lang="fr-FR" smtClean="0"/>
-              <a:t>de données</a:t>
+              <a:t>données.</a:t>
             </a:r>
             <a:endParaRPr lang="fr-FR" dirty="0" smtClean="0"/>
           </a:p>
@@ -5997,13 +6006,10 @@
               <a:t>Création de </a:t>
             </a:r>
             <a:r>
-              <a:rPr lang="fr-FR" dirty="0" err="1" smtClean="0"/>
-              <a:t>videos</a:t>
-            </a:r>
-            <a:r>
               <a:rPr lang="fr-FR" dirty="0" smtClean="0"/>
-              <a:t> VR</a:t>
-            </a:r>
+              <a:t>vidéos VR.</a:t>
+            </a:r>
+            <a:endParaRPr lang="fr-FR" dirty="0" smtClean="0"/>
           </a:p>
           <a:p>
             <a:r>
@@ -6019,7 +6025,19 @@
             <a:pPr lvl="1"/>
             <a:r>
               <a:rPr lang="fr-FR" dirty="0" smtClean="0"/>
-              <a:t>Programmation de l’application VR</a:t>
+              <a:t>Programmation de l’application </a:t>
+            </a:r>
+            <a:r>
+              <a:rPr lang="fr-FR" dirty="0" smtClean="0"/>
+              <a:t>A</a:t>
+            </a:r>
+            <a:r>
+              <a:rPr lang="fr-FR" dirty="0" smtClean="0"/>
+              <a:t>ndroid</a:t>
+            </a:r>
+            <a:r>
+              <a:rPr lang="fr-FR" dirty="0" smtClean="0"/>
+              <a:t>.</a:t>
             </a:r>
             <a:endParaRPr lang="fr-FR" dirty="0"/>
           </a:p>
@@ -6095,20 +6113,31 @@
           <a:p>
             <a:r>
               <a:rPr lang="fr-FR" dirty="0" smtClean="0"/>
-              <a:t>Transmetteurs IR (Infrarouge)</a:t>
-            </a:r>
+              <a:t>Tags NFC;</a:t>
+            </a:r>
+            <a:endParaRPr lang="fr-FR" dirty="0" smtClean="0"/>
           </a:p>
           <a:p>
             <a:r>
               <a:rPr lang="fr-FR" dirty="0" smtClean="0"/>
-              <a:t>Casque de réalité virtuelle adaptable aux smartphones</a:t>
-            </a:r>
-          </a:p>
-          <a:p>
+              <a:t>Casque de réalité virtuelle adaptable aux </a:t>
+            </a:r>
             <a:r>
               <a:rPr lang="fr-FR" dirty="0" smtClean="0"/>
-              <a:t>Smartphone compatible aux casques de réalité virtuelle</a:t>
-            </a:r>
+              <a:t>smartphones;</a:t>
+            </a:r>
+            <a:endParaRPr lang="fr-FR" dirty="0" smtClean="0"/>
+          </a:p>
+          <a:p>
+            <a:r>
+              <a:rPr lang="fr-FR" dirty="0" smtClean="0"/>
+              <a:t>Smartphone compatible aux casques de réalité </a:t>
+            </a:r>
+            <a:r>
+              <a:rPr lang="fr-FR" dirty="0" smtClean="0"/>
+              <a:t>virtuelle et muni de la technologie NFC.</a:t>
+            </a:r>
+            <a:endParaRPr lang="fr-FR" dirty="0" smtClean="0"/>
           </a:p>
         </p:txBody>
       </p:sp>

</xml_diff>

<commit_message>
Mise à jour du slider
</commit_message>
<xml_diff>
--- a/annexes/slides-VR_Tourism.pptx
+++ b/annexes/slides-VR_Tourism.pptx
@@ -11,6 +11,7 @@
     <p:sldId id="259" r:id="rId5"/>
     <p:sldId id="260" r:id="rId6"/>
     <p:sldId id="261" r:id="rId7"/>
+    <p:sldId id="262" r:id="rId8"/>
   </p:sldIdLst>
   <p:sldSz cx="12192000" cy="6858000"/>
   <p:notesSz cx="6858000" cy="9144000"/>
@@ -212,7 +213,7 @@
           <a:effectLst/>
           <a:extLst>
             <a:ext uri="{91240B29-F687-4f45-9708-019B960494DF}">
-              <a14:hiddenLine xmlns="" xmlns:a14="http://schemas.microsoft.com/office/drawing/2010/main" w="9525">
+              <a14:hiddenLine xmlns:a14="http://schemas.microsoft.com/office/drawing/2010/main" xmlns="" w="9525">
                 <a:solidFill>
                   <a:srgbClr val="000000"/>
                 </a:solidFill>
@@ -405,7 +406,7 @@
             <a:fld id="{08B9EBBA-996F-894A-B54A-D6246ED52CEA}" type="datetimeFigureOut">
               <a:rPr lang="en-US" dirty="0"/>
               <a:pPr/>
-              <a:t>3/13/2018</a:t>
+              <a:t>4/3/2018</a:t>
             </a:fld>
             <a:endParaRPr lang="en-US" dirty="0"/>
           </a:p>
@@ -720,7 +721,7 @@
             <a:fld id="{18C79C5D-2A6F-F04D-97DA-BEF2467B64E4}" type="datetimeFigureOut">
               <a:rPr lang="en-US" dirty="0"/>
               <a:pPr/>
-              <a:t>3/13/2018</a:t>
+              <a:t>4/3/2018</a:t>
             </a:fld>
             <a:endParaRPr lang="en-US" dirty="0"/>
           </a:p>
@@ -1205,7 +1206,7 @@
             <a:fld id="{8DFA1846-DA80-1C48-A609-854EA85C59AD}" type="datetimeFigureOut">
               <a:rPr lang="en-US" dirty="0"/>
               <a:pPr/>
-              <a:t>3/13/2018</a:t>
+              <a:t>4/3/2018</a:t>
             </a:fld>
             <a:endParaRPr lang="en-US" dirty="0"/>
           </a:p>
@@ -1571,7 +1572,7 @@
             <a:fld id="{FBF54567-0DE4-3F47-BF90-CB84690072F9}" type="datetimeFigureOut">
               <a:rPr lang="en-US" dirty="0"/>
               <a:pPr/>
-              <a:t>3/13/2018</a:t>
+              <a:t>4/3/2018</a:t>
             </a:fld>
             <a:endParaRPr lang="en-US" dirty="0"/>
           </a:p>
@@ -1722,7 +1723,7 @@
           <a:ln/>
           <a:extLst>
             <a:ext uri="{91240B29-F687-4f45-9708-019B960494DF}">
-              <a14:hiddenLine xmlns="" xmlns:a14="http://schemas.microsoft.com/office/drawing/2010/main" w="9525">
+              <a14:hiddenLine xmlns:a14="http://schemas.microsoft.com/office/drawing/2010/main" xmlns="" w="9525">
                 <a:solidFill>
                   <a:srgbClr val="000000"/>
                 </a:solidFill>
@@ -1841,7 +1842,7 @@
             <a:fld id="{C6C52C72-DE31-F449-A4ED-4C594FD91407}" type="datetimeFigureOut">
               <a:rPr lang="en-US" dirty="0"/>
               <a:pPr/>
-              <a:t>3/13/2018</a:t>
+              <a:t>4/3/2018</a:t>
             </a:fld>
             <a:endParaRPr lang="en-US" dirty="0"/>
           </a:p>
@@ -1994,7 +1995,7 @@
           <a:ln/>
           <a:extLst>
             <a:ext uri="{91240B29-F687-4f45-9708-019B960494DF}">
-              <a14:hiddenLine xmlns="" xmlns:a14="http://schemas.microsoft.com/office/drawing/2010/main" w="9525">
+              <a14:hiddenLine xmlns:a14="http://schemas.microsoft.com/office/drawing/2010/main" xmlns="" w="9525">
                 <a:solidFill>
                   <a:srgbClr val="000000"/>
                 </a:solidFill>
@@ -2123,7 +2124,7 @@
             <a:fld id="{ED62726E-379B-B349-9EED-81ED093FA806}" type="datetimeFigureOut">
               <a:rPr lang="en-US" dirty="0"/>
               <a:pPr/>
-              <a:t>3/13/2018</a:t>
+              <a:t>4/3/2018</a:t>
             </a:fld>
             <a:endParaRPr lang="en-US" dirty="0"/>
           </a:p>
@@ -2274,7 +2275,7 @@
           <a:ln/>
           <a:extLst>
             <a:ext uri="{91240B29-F687-4f45-9708-019B960494DF}">
-              <a14:hiddenLine xmlns="" xmlns:a14="http://schemas.microsoft.com/office/drawing/2010/main" w="9525">
+              <a14:hiddenLine xmlns:a14="http://schemas.microsoft.com/office/drawing/2010/main" xmlns="" w="9525">
                 <a:solidFill>
                   <a:srgbClr val="000000"/>
                 </a:solidFill>
@@ -2403,7 +2404,7 @@
             <a:fld id="{9B3A1323-8D79-1946-B0D7-40001CF92E9D}" type="datetimeFigureOut">
               <a:rPr lang="en-US" dirty="0"/>
               <a:pPr/>
-              <a:t>3/13/2018</a:t>
+              <a:t>4/3/2018</a:t>
             </a:fld>
             <a:endParaRPr lang="en-US" dirty="0"/>
           </a:p>
@@ -2743,7 +2744,7 @@
             <a:fld id="{8DFA1846-DA80-1C48-A609-854EA85C59AD}" type="datetimeFigureOut">
               <a:rPr lang="en-US" dirty="0"/>
               <a:pPr/>
-              <a:t>3/13/2018</a:t>
+              <a:t>4/3/2018</a:t>
             </a:fld>
             <a:endParaRPr lang="en-US" dirty="0"/>
           </a:p>
@@ -2894,7 +2895,7 @@
           <a:ln/>
           <a:extLst>
             <a:ext uri="{91240B29-F687-4f45-9708-019B960494DF}">
-              <a14:hiddenLine xmlns="" xmlns:a14="http://schemas.microsoft.com/office/drawing/2010/main" w="9525">
+              <a14:hiddenLine xmlns:a14="http://schemas.microsoft.com/office/drawing/2010/main" xmlns="" w="9525">
                 <a:solidFill>
                   <a:srgbClr val="000000"/>
                 </a:solidFill>
@@ -3079,7 +3080,7 @@
             <a:fld id="{57302355-E14B-8545-A8F8-0FE83CC9D524}" type="datetimeFigureOut">
               <a:rPr lang="en-US" dirty="0"/>
               <a:pPr/>
-              <a:t>3/13/2018</a:t>
+              <a:t>4/3/2018</a:t>
             </a:fld>
             <a:endParaRPr lang="en-US" dirty="0"/>
           </a:p>
@@ -3230,7 +3231,7 @@
           <a:ln/>
           <a:extLst>
             <a:ext uri="{91240B29-F687-4f45-9708-019B960494DF}">
-              <a14:hiddenLine xmlns="" xmlns:a14="http://schemas.microsoft.com/office/drawing/2010/main" w="9525">
+              <a14:hiddenLine xmlns:a14="http://schemas.microsoft.com/office/drawing/2010/main" xmlns="" w="9525">
                 <a:solidFill>
                   <a:srgbClr val="000000"/>
                 </a:solidFill>
@@ -3553,7 +3554,7 @@
             <a:fld id="{02640F58-564D-2B4F-AE67-E407BA4FCF45}" type="datetimeFigureOut">
               <a:rPr lang="en-US" dirty="0"/>
               <a:pPr/>
-              <a:t>3/13/2018</a:t>
+              <a:t>4/3/2018</a:t>
             </a:fld>
             <a:endParaRPr lang="en-US" dirty="0"/>
           </a:p>
@@ -3704,7 +3705,7 @@
           <a:ln/>
           <a:extLst>
             <a:ext uri="{91240B29-F687-4f45-9708-019B960494DF}">
-              <a14:hiddenLine xmlns="" xmlns:a14="http://schemas.microsoft.com/office/drawing/2010/main" w="9525">
+              <a14:hiddenLine xmlns:a14="http://schemas.microsoft.com/office/drawing/2010/main" xmlns="" w="9525">
                 <a:solidFill>
                   <a:srgbClr val="000000"/>
                 </a:solidFill>
@@ -3771,7 +3772,7 @@
             <a:fld id="{F13A34C8-038E-2045-AF43-DF7DBB8E0E9E}" type="datetimeFigureOut">
               <a:rPr lang="en-US" dirty="0"/>
               <a:pPr/>
-              <a:t>3/13/2018</a:t>
+              <a:t>4/3/2018</a:t>
             </a:fld>
             <a:endParaRPr lang="en-US" dirty="0"/>
           </a:p>
@@ -3863,7 +3864,7 @@
             <a:fld id="{8818C68F-D26B-8F47-958C-23B49CF8A634}" type="datetimeFigureOut">
               <a:rPr lang="en-US" dirty="0"/>
               <a:pPr/>
-              <a:t>3/13/2018</a:t>
+              <a:t>4/3/2018</a:t>
             </a:fld>
             <a:endParaRPr lang="en-US" dirty="0"/>
           </a:p>
@@ -4127,7 +4128,7 @@
           <a:ln/>
           <a:extLst>
             <a:ext uri="{91240B29-F687-4f45-9708-019B960494DF}">
-              <a14:hiddenLine xmlns="" xmlns:a14="http://schemas.microsoft.com/office/drawing/2010/main" w="9525">
+              <a14:hiddenLine xmlns:a14="http://schemas.microsoft.com/office/drawing/2010/main" xmlns="" w="9525">
                 <a:solidFill>
                   <a:srgbClr val="000000"/>
                 </a:solidFill>
@@ -4327,7 +4328,7 @@
             <a:fld id="{D0DF5E60-9974-AC48-9591-99C2BB44B7CF}" type="datetimeFigureOut">
               <a:rPr lang="en-US" dirty="0"/>
               <a:pPr/>
-              <a:t>3/13/2018</a:t>
+              <a:t>4/3/2018</a:t>
             </a:fld>
             <a:endParaRPr lang="en-US" dirty="0"/>
           </a:p>
@@ -4637,7 +4638,7 @@
             <a:fld id="{18C79C5D-2A6F-F04D-97DA-BEF2467B64E4}" type="datetimeFigureOut">
               <a:rPr lang="en-US" dirty="0"/>
               <a:pPr/>
-              <a:t>3/13/2018</a:t>
+              <a:t>4/3/2018</a:t>
             </a:fld>
             <a:endParaRPr lang="en-US" dirty="0"/>
           </a:p>
@@ -4904,7 +4905,7 @@
             <a:fld id="{09B482E8-6E0E-1B4F-B1FD-C69DB9E858D9}" type="datetimeFigureOut">
               <a:rPr lang="en-US" dirty="0"/>
               <a:pPr/>
-              <a:t>3/13/2018</a:t>
+              <a:t>4/3/2018</a:t>
             </a:fld>
             <a:endParaRPr lang="en-US" dirty="0"/>
           </a:p>
@@ -5710,20 +5711,90 @@
               <a:buNone/>
             </a:pPr>
             <a:r>
+              <a:rPr lang="fr-FR" dirty="0" smtClean="0"/>
+              <a:t>L’application </a:t>
+            </a:r>
+            <a:r>
+              <a:rPr lang="fr-FR" dirty="0" err="1" smtClean="0"/>
+              <a:t>VRTourism</a:t>
+            </a:r>
+            <a:r>
+              <a:rPr lang="fr-FR" dirty="0" smtClean="0"/>
+              <a:t> est destinée à :</a:t>
+            </a:r>
+          </a:p>
+          <a:p>
+            <a:pPr lvl="1"/>
+            <a:r>
+              <a:rPr lang="fr-FR" dirty="0" smtClean="0"/>
+              <a:t>Guider l’utilisateur dans </a:t>
+            </a:r>
+            <a:r>
               <a:rPr lang="fr-FR" dirty="0"/>
-              <a:t>Outil permettant aux touristes d’être guidés dans un lieux historique ou dans un </a:t>
-            </a:r>
-            <a:r>
-              <a:rPr lang="fr-FR" dirty="0" smtClean="0"/>
-              <a:t>monument, via des capteurs, leur smartphone, et un casque de réalité virtuelle, afin </a:t>
+              <a:t>un </a:t>
+            </a:r>
+            <a:r>
+              <a:rPr lang="fr-FR" dirty="0" smtClean="0"/>
+              <a:t>lieu touristique;</a:t>
+            </a:r>
+            <a:endParaRPr lang="fr-FR" dirty="0"/>
+          </a:p>
+          <a:p>
+            <a:pPr lvl="1"/>
+            <a:r>
+              <a:rPr lang="fr-FR" dirty="0" smtClean="0"/>
+              <a:t>Informer l’utilisateur </a:t>
+            </a:r>
+            <a:r>
+              <a:rPr lang="fr-FR" dirty="0" smtClean="0"/>
+              <a:t>sur les différents événements historiques d’un musée.</a:t>
+            </a:r>
+          </a:p>
+          <a:p>
+            <a:pPr marL="457200" lvl="1" indent="0">
+              <a:buNone/>
+            </a:pPr>
+            <a:endParaRPr lang="fr-FR" dirty="0" smtClean="0"/>
+          </a:p>
+          <a:p>
+            <a:pPr marL="0" indent="0">
+              <a:buNone/>
+            </a:pPr>
+            <a:r>
+              <a:rPr lang="fr-FR" dirty="0" smtClean="0"/>
+              <a:t>Via </a:t>
+            </a:r>
+            <a:r>
+              <a:rPr lang="fr-FR" dirty="0" smtClean="0"/>
+              <a:t>leur smartphone (compatible NFC) et </a:t>
+            </a:r>
+            <a:r>
+              <a:rPr lang="fr-FR" dirty="0" smtClean="0"/>
+              <a:t>un casque de réalité </a:t>
+            </a:r>
+            <a:r>
+              <a:rPr lang="fr-FR" dirty="0" smtClean="0"/>
+              <a:t>virtuelle, ils pourront bénéficier </a:t>
             </a:r>
             <a:r>
               <a:rPr lang="fr-FR" dirty="0"/>
-              <a:t>de bénéficier d’animations dynamiques pour connaitre l’histoire d’un tableau, d’une statue, </a:t>
-            </a:r>
-            <a:r>
-              <a:rPr lang="fr-FR" dirty="0" smtClean="0"/>
-              <a:t>ou d’un autre type d’endroit atypique.</a:t>
+              <a:t>d’animations dynamiques pour </a:t>
+            </a:r>
+            <a:r>
+              <a:rPr lang="fr-FR" dirty="0" smtClean="0"/>
+              <a:t>connaître </a:t>
+            </a:r>
+            <a:r>
+              <a:rPr lang="fr-FR" dirty="0"/>
+              <a:t>l’histoire d’un tableau, d’une statue, </a:t>
+            </a:r>
+            <a:r>
+              <a:rPr lang="fr-FR" dirty="0" smtClean="0"/>
+              <a:t>ou d’un </a:t>
+            </a:r>
+            <a:r>
+              <a:rPr lang="fr-FR" dirty="0" smtClean="0"/>
+              <a:t>autre élément touristique.</a:t>
             </a:r>
             <a:endParaRPr lang="fr-FR" dirty="0"/>
           </a:p>
@@ -5824,7 +5895,19 @@
           <a:p>
             <a:r>
               <a:rPr lang="fr-FR" dirty="0" smtClean="0"/>
-              <a:t>Apprendre aux touristes l’histoire de l’endroit ou de l’objet concerné</a:t>
+              <a:t>Informer les touristes sur </a:t>
+            </a:r>
+            <a:r>
+              <a:rPr lang="fr-FR" dirty="0" smtClean="0"/>
+              <a:t>l’histoire </a:t>
+            </a:r>
+            <a:r>
+              <a:rPr lang="fr-FR" dirty="0" smtClean="0"/>
+              <a:t>de </a:t>
+            </a:r>
+            <a:r>
+              <a:rPr lang="fr-FR" dirty="0" smtClean="0"/>
+              <a:t>l’endroit ou de l’objet concerné</a:t>
             </a:r>
           </a:p>
           <a:p>
@@ -5913,9 +5996,16 @@
             <p:ph idx="1"/>
           </p:nvPr>
         </p:nvSpPr>
-        <p:spPr/>
-        <p:txBody>
-          <a:bodyPr/>
+        <p:spPr>
+          <a:xfrm>
+            <a:off x="818712" y="2671173"/>
+            <a:ext cx="10554574" cy="3636511"/>
+          </a:xfrm>
+        </p:spPr>
+        <p:txBody>
+          <a:bodyPr>
+            <a:normAutofit fontScale="85000" lnSpcReduction="20000"/>
+          </a:bodyPr>
           <a:lstStyle/>
           <a:p>
             <a:r>
@@ -5928,26 +6018,26 @@
             </a:r>
             <a:r>
               <a:rPr lang="fr-FR" dirty="0" smtClean="0"/>
-              <a:t> Mohamed :</a:t>
+              <a:t> Mohamed </a:t>
+            </a:r>
+            <a:r>
+              <a:rPr lang="fr-FR" dirty="0" smtClean="0"/>
+              <a:t>:</a:t>
             </a:r>
           </a:p>
           <a:p>
             <a:pPr lvl="1"/>
             <a:r>
               <a:rPr lang="fr-FR" dirty="0" smtClean="0"/>
-              <a:t>Mise en </a:t>
-            </a:r>
-            <a:r>
-              <a:rPr lang="fr-FR" dirty="0" smtClean="0"/>
-              <a:t>place de l’architecture via </a:t>
-            </a:r>
-            <a:r>
-              <a:rPr lang="fr-FR" dirty="0" smtClean="0"/>
-              <a:t>le </a:t>
-            </a:r>
-            <a:r>
-              <a:rPr lang="fr-FR" dirty="0" smtClean="0"/>
-              <a:t>NFC.</a:t>
+              <a:t>Mise en place de la communication entre l’application </a:t>
+            </a:r>
+            <a:r>
+              <a:rPr lang="fr-FR" dirty="0"/>
+              <a:t>A</a:t>
+            </a:r>
+            <a:r>
+              <a:rPr lang="fr-FR" dirty="0" smtClean="0"/>
+              <a:t>ndroid et le serveur.</a:t>
             </a:r>
             <a:endParaRPr lang="fr-FR" dirty="0" smtClean="0"/>
           </a:p>
@@ -5973,11 +6063,18 @@
             <a:pPr lvl="1"/>
             <a:r>
               <a:rPr lang="fr-FR" dirty="0" smtClean="0"/>
-              <a:t>Programmation du Web Service et base de </a:t>
-            </a:r>
-            <a:r>
-              <a:rPr lang="fr-FR" dirty="0" smtClean="0"/>
-              <a:t>données.</a:t>
+              <a:t>Programmation du Web </a:t>
+            </a:r>
+            <a:r>
+              <a:rPr lang="fr-FR" dirty="0" smtClean="0"/>
+              <a:t>Service (serveur).</a:t>
+            </a:r>
+          </a:p>
+          <a:p>
+            <a:pPr lvl="1"/>
+            <a:r>
+              <a:rPr lang="fr-FR" dirty="0" smtClean="0"/>
+              <a:t>Mise en place d’un back-office (Mise à jour des vidéos dans la base de données).</a:t>
             </a:r>
             <a:endParaRPr lang="fr-FR" dirty="0" smtClean="0"/>
           </a:p>
@@ -6003,11 +6100,34 @@
             <a:pPr lvl="1"/>
             <a:r>
               <a:rPr lang="fr-FR" dirty="0" smtClean="0"/>
-              <a:t>Création de </a:t>
-            </a:r>
-            <a:r>
-              <a:rPr lang="fr-FR" dirty="0" smtClean="0"/>
-              <a:t>vidéos VR.</a:t>
+              <a:t>Création </a:t>
+            </a:r>
+            <a:r>
+              <a:rPr lang="fr-FR" dirty="0" smtClean="0"/>
+              <a:t>et implémentation de vidéos VR.</a:t>
+            </a:r>
+          </a:p>
+          <a:p>
+            <a:pPr lvl="1"/>
+            <a:r>
+              <a:rPr lang="fr-FR" dirty="0" smtClean="0"/>
+              <a:t>Insertion (</a:t>
+            </a:r>
+            <a:r>
+              <a:rPr lang="fr-FR" dirty="0" err="1" smtClean="0"/>
+              <a:t>upload</a:t>
+            </a:r>
+            <a:r>
+              <a:rPr lang="fr-FR" dirty="0" smtClean="0"/>
+              <a:t>) de vidéos VR sur la chaîne </a:t>
+            </a:r>
+            <a:r>
+              <a:rPr lang="fr-FR" dirty="0" err="1" smtClean="0"/>
+              <a:t>Youtube</a:t>
+            </a:r>
+            <a:r>
+              <a:rPr lang="fr-FR" dirty="0" smtClean="0"/>
+              <a:t>.</a:t>
             </a:r>
             <a:endParaRPr lang="fr-FR" dirty="0" smtClean="0"/>
           </a:p>
@@ -6018,26 +6138,36 @@
             </a:r>
             <a:r>
               <a:rPr lang="fr-FR" dirty="0" smtClean="0"/>
-              <a:t> Romain :</a:t>
+              <a:t> Romain </a:t>
+            </a:r>
+            <a:r>
+              <a:rPr lang="fr-FR" dirty="0" smtClean="0"/>
+              <a:t>:</a:t>
             </a:r>
           </a:p>
           <a:p>
             <a:pPr lvl="1"/>
             <a:r>
-              <a:rPr lang="fr-FR" dirty="0" smtClean="0"/>
-              <a:t>Programmation de l’application </a:t>
-            </a:r>
-            <a:r>
-              <a:rPr lang="fr-FR" dirty="0" smtClean="0"/>
-              <a:t>A</a:t>
-            </a:r>
-            <a:r>
-              <a:rPr lang="fr-FR" dirty="0" smtClean="0"/>
-              <a:t>ndroid</a:t>
-            </a:r>
-            <a:r>
-              <a:rPr lang="fr-FR" dirty="0" smtClean="0"/>
-              <a:t>.</a:t>
+              <a:rPr lang="fr-FR" dirty="0"/>
+              <a:t>Mise en place de l’architecture </a:t>
+            </a:r>
+            <a:r>
+              <a:rPr lang="fr-FR" dirty="0" smtClean="0"/>
+              <a:t>NFC.</a:t>
+            </a:r>
+          </a:p>
+          <a:p>
+            <a:pPr lvl="1"/>
+            <a:r>
+              <a:rPr lang="fr-FR" dirty="0" smtClean="0"/>
+              <a:t>Création interface Application.</a:t>
+            </a:r>
+          </a:p>
+          <a:p>
+            <a:pPr lvl="1"/>
+            <a:r>
+              <a:rPr lang="fr-FR" dirty="0" smtClean="0"/>
+              <a:t>Gestion du matériel.</a:t>
             </a:r>
             <a:endParaRPr lang="fr-FR" dirty="0"/>
           </a:p>
@@ -6106,37 +6236,166 @@
             <p:ph idx="1"/>
           </p:nvPr>
         </p:nvSpPr>
-        <p:spPr/>
-        <p:txBody>
-          <a:bodyPr/>
-          <a:lstStyle/>
-          <a:p>
-            <a:r>
-              <a:rPr lang="fr-FR" dirty="0" smtClean="0"/>
-              <a:t>Tags NFC;</a:t>
-            </a:r>
+        <p:spPr>
+          <a:xfrm>
+            <a:off x="810000" y="2579734"/>
+            <a:ext cx="10554574" cy="4203451"/>
+          </a:xfrm>
+        </p:spPr>
+        <p:txBody>
+          <a:bodyPr>
+            <a:normAutofit fontScale="92500" lnSpcReduction="20000"/>
+          </a:bodyPr>
+          <a:lstStyle/>
+          <a:p>
             <a:endParaRPr lang="fr-FR" dirty="0" smtClean="0"/>
           </a:p>
           <a:p>
             <a:r>
               <a:rPr lang="fr-FR" dirty="0" smtClean="0"/>
-              <a:t>Casque de réalité virtuelle adaptable aux </a:t>
-            </a:r>
-            <a:r>
-              <a:rPr lang="fr-FR" dirty="0" smtClean="0"/>
-              <a:t>smartphones;</a:t>
+              <a:t>Tags NFC</a:t>
+            </a:r>
+          </a:p>
+          <a:p>
+            <a:pPr lvl="1"/>
+            <a:r>
+              <a:rPr lang="fr-FR" dirty="0" smtClean="0"/>
+              <a:t>NFC sticker tags (NTAG2313)</a:t>
             </a:r>
             <a:endParaRPr lang="fr-FR" dirty="0" smtClean="0"/>
           </a:p>
           <a:p>
             <a:r>
               <a:rPr lang="fr-FR" dirty="0" smtClean="0"/>
-              <a:t>Smartphone compatible aux casques de réalité </a:t>
-            </a:r>
-            <a:r>
-              <a:rPr lang="fr-FR" dirty="0" smtClean="0"/>
-              <a:t>virtuelle et muni de la technologie NFC.</a:t>
-            </a:r>
+              <a:t>Casque de réalité </a:t>
+            </a:r>
+            <a:r>
+              <a:rPr lang="fr-FR" dirty="0" smtClean="0"/>
+              <a:t>virtuelle;</a:t>
+            </a:r>
+          </a:p>
+          <a:p>
+            <a:pPr lvl="1"/>
+            <a:r>
+              <a:rPr lang="fr-FR" dirty="0" smtClean="0"/>
+              <a:t>Casque </a:t>
+            </a:r>
+            <a:r>
+              <a:rPr lang="fr-FR" dirty="0" err="1" smtClean="0"/>
+              <a:t>iHarbort</a:t>
+            </a:r>
+            <a:r>
+              <a:rPr lang="fr-FR" dirty="0" smtClean="0"/>
+              <a:t> (Virtual reality glasses)</a:t>
+            </a:r>
+            <a:endParaRPr lang="fr-FR" dirty="0" smtClean="0"/>
+          </a:p>
+          <a:p>
+            <a:r>
+              <a:rPr lang="fr-FR" dirty="0" smtClean="0"/>
+              <a:t>Smartphone </a:t>
+            </a:r>
+            <a:r>
+              <a:rPr lang="fr-FR" dirty="0" smtClean="0"/>
+              <a:t>compatible casque VR et </a:t>
+            </a:r>
+            <a:r>
+              <a:rPr lang="fr-FR" dirty="0" smtClean="0"/>
+              <a:t>muni de la technologie NFC</a:t>
+            </a:r>
+            <a:r>
+              <a:rPr lang="fr-FR" dirty="0" smtClean="0"/>
+              <a:t>.</a:t>
+            </a:r>
+          </a:p>
+          <a:p>
+            <a:pPr lvl="1"/>
+            <a:r>
+              <a:rPr lang="fr-FR" dirty="0" smtClean="0"/>
+              <a:t>Samsung </a:t>
+            </a:r>
+            <a:r>
+              <a:rPr lang="fr-FR" dirty="0" err="1" smtClean="0"/>
+              <a:t>Galaxy</a:t>
+            </a:r>
+            <a:r>
+              <a:rPr lang="fr-FR" dirty="0" smtClean="0"/>
+              <a:t> S6</a:t>
+            </a:r>
+          </a:p>
+          <a:p>
+            <a:r>
+              <a:rPr lang="fr-FR" dirty="0" smtClean="0"/>
+              <a:t>Serveur </a:t>
+            </a:r>
+            <a:r>
+              <a:rPr lang="fr-FR" dirty="0" err="1" smtClean="0"/>
+              <a:t>debian</a:t>
+            </a:r>
+            <a:r>
+              <a:rPr lang="fr-FR" dirty="0" smtClean="0"/>
+              <a:t> </a:t>
+            </a:r>
+          </a:p>
+          <a:p>
+            <a:pPr lvl="1"/>
+            <a:r>
+              <a:rPr lang="fr-FR" dirty="0" err="1" smtClean="0"/>
+              <a:t>Lamp</a:t>
+            </a:r>
+            <a:r>
+              <a:rPr lang="fr-FR" dirty="0" smtClean="0"/>
+              <a:t> </a:t>
+            </a:r>
+            <a:r>
+              <a:rPr lang="fr-FR" dirty="0"/>
+              <a:t>(Linux, apache, MySQL, </a:t>
+            </a:r>
+            <a:r>
+              <a:rPr lang="fr-FR" dirty="0" err="1"/>
+              <a:t>php</a:t>
+            </a:r>
+            <a:r>
+              <a:rPr lang="fr-FR" dirty="0" smtClean="0"/>
+              <a:t>)</a:t>
+            </a:r>
+          </a:p>
+          <a:p>
+            <a:r>
+              <a:rPr lang="fr-FR" dirty="0" err="1" smtClean="0"/>
+              <a:t>Unity</a:t>
+            </a:r>
+            <a:endParaRPr lang="fr-FR" dirty="0" smtClean="0"/>
+          </a:p>
+          <a:p>
+            <a:r>
+              <a:rPr lang="fr-FR" dirty="0" smtClean="0"/>
+              <a:t>Android Studio (IDE) – langage Java</a:t>
+            </a:r>
+          </a:p>
+          <a:p>
+            <a:r>
+              <a:rPr lang="fr-FR" dirty="0" err="1" smtClean="0"/>
+              <a:t>PhpStorm</a:t>
+            </a:r>
+            <a:r>
+              <a:rPr lang="fr-FR" dirty="0" smtClean="0"/>
+              <a:t> (IDE) - langage PHP</a:t>
+            </a:r>
+          </a:p>
+          <a:p>
+            <a:pPr marL="0" indent="0">
+              <a:buNone/>
+            </a:pPr>
+            <a:endParaRPr lang="fr-FR" dirty="0" smtClean="0"/>
+          </a:p>
+          <a:p>
+            <a:pPr marL="457200" lvl="1" indent="0">
+              <a:buNone/>
+            </a:pPr>
+            <a:endParaRPr lang="fr-FR" dirty="0" smtClean="0"/>
+          </a:p>
+          <a:p>
             <a:endParaRPr lang="fr-FR" dirty="0" smtClean="0"/>
           </a:p>
         </p:txBody>
@@ -6145,6 +6404,161 @@
     <p:extLst>
       <p:ext uri="{BB962C8B-B14F-4D97-AF65-F5344CB8AC3E}">
         <p14:creationId xmlns:p14="http://schemas.microsoft.com/office/powerpoint/2010/main" val="2084653172"/>
+      </p:ext>
+    </p:extLst>
+  </p:cSld>
+  <p:clrMapOvr>
+    <a:masterClrMapping/>
+  </p:clrMapOvr>
+</p:sld>
+</file>
+
+<file path=ppt/slides/slide7.xml><?xml version="1.0" encoding="utf-8"?>
+<p:sld xmlns:a="http://schemas.openxmlformats.org/drawingml/2006/main" xmlns:r="http://schemas.openxmlformats.org/officeDocument/2006/relationships" xmlns:p="http://schemas.openxmlformats.org/presentationml/2006/main">
+  <p:cSld>
+    <p:spTree>
+      <p:nvGrpSpPr>
+        <p:cNvPr id="1" name=""/>
+        <p:cNvGrpSpPr/>
+        <p:nvPr/>
+      </p:nvGrpSpPr>
+      <p:grpSpPr>
+        <a:xfrm>
+          <a:off x="0" y="0"/>
+          <a:ext cx="0" cy="0"/>
+          <a:chOff x="0" y="0"/>
+          <a:chExt cx="0" cy="0"/>
+        </a:xfrm>
+      </p:grpSpPr>
+      <p:sp>
+        <p:nvSpPr>
+          <p:cNvPr id="2" name="Titre 1"/>
+          <p:cNvSpPr>
+            <a:spLocks noGrp="1"/>
+          </p:cNvSpPr>
+          <p:nvPr>
+            <p:ph type="title"/>
+          </p:nvPr>
+        </p:nvSpPr>
+        <p:spPr/>
+        <p:txBody>
+          <a:bodyPr/>
+          <a:lstStyle/>
+          <a:p>
+            <a:r>
+              <a:rPr lang="fr-FR" dirty="0" smtClean="0"/>
+              <a:t>Démo</a:t>
+            </a:r>
+            <a:endParaRPr lang="fr-FR" dirty="0"/>
+          </a:p>
+        </p:txBody>
+      </p:sp>
+      <p:sp>
+        <p:nvSpPr>
+          <p:cNvPr id="3" name="Espace réservé du contenu 2"/>
+          <p:cNvSpPr>
+            <a:spLocks noGrp="1"/>
+          </p:cNvSpPr>
+          <p:nvPr>
+            <p:ph idx="1"/>
+          </p:nvPr>
+        </p:nvSpPr>
+        <p:spPr/>
+        <p:txBody>
+          <a:bodyPr>
+            <a:normAutofit/>
+          </a:bodyPr>
+          <a:lstStyle/>
+          <a:p>
+            <a:pPr marL="0" indent="0">
+              <a:buNone/>
+            </a:pPr>
+            <a:r>
+              <a:rPr lang="fr-FR" sz="2400" dirty="0" smtClean="0"/>
+              <a:t>Comment ça marche ?</a:t>
+            </a:r>
+          </a:p>
+          <a:p>
+            <a:r>
+              <a:rPr lang="fr-FR" dirty="0"/>
+              <a:t>1 - Approcher un tag NFC</a:t>
+            </a:r>
+            <a:r>
+              <a:rPr lang="fr-FR" dirty="0" smtClean="0"/>
+              <a:t>.</a:t>
+            </a:r>
+            <a:endParaRPr lang="fr-FR" dirty="0"/>
+          </a:p>
+          <a:p>
+            <a:r>
+              <a:rPr lang="fr-FR" dirty="0"/>
+              <a:t>2 - L'application récupère la vidéo depuis le serveur</a:t>
+            </a:r>
+            <a:r>
+              <a:rPr lang="fr-FR" dirty="0" smtClean="0"/>
+              <a:t>.</a:t>
+            </a:r>
+            <a:endParaRPr lang="fr-FR" dirty="0"/>
+          </a:p>
+          <a:p>
+            <a:r>
+              <a:rPr lang="fr-FR" dirty="0"/>
+              <a:t>3 - L'application ouvre l'application </a:t>
+            </a:r>
+            <a:r>
+              <a:rPr lang="fr-FR" dirty="0" err="1" smtClean="0"/>
+              <a:t>Youtube</a:t>
+            </a:r>
+            <a:r>
+              <a:rPr lang="fr-FR" dirty="0" smtClean="0"/>
+              <a:t>.</a:t>
+            </a:r>
+            <a:endParaRPr lang="fr-FR" dirty="0"/>
+          </a:p>
+          <a:p>
+            <a:r>
+              <a:rPr lang="fr-FR" dirty="0"/>
+              <a:t>4 - Vous devez mettre en plein écran la vidéo </a:t>
+            </a:r>
+            <a:r>
+              <a:rPr lang="fr-FR" dirty="0" err="1"/>
+              <a:t>Youtube</a:t>
+            </a:r>
+            <a:r>
+              <a:rPr lang="fr-FR" dirty="0" smtClean="0"/>
+              <a:t>.</a:t>
+            </a:r>
+            <a:endParaRPr lang="fr-FR" dirty="0"/>
+          </a:p>
+          <a:p>
+            <a:r>
+              <a:rPr lang="fr-FR" dirty="0"/>
+              <a:t>5 - Vous devez ensuite cliquer sur le bouton VR en bas à droite de la vidéo</a:t>
+            </a:r>
+            <a:r>
+              <a:rPr lang="fr-FR" dirty="0" smtClean="0"/>
+              <a:t>.</a:t>
+            </a:r>
+          </a:p>
+          <a:p>
+            <a:endParaRPr lang="fr-FR" dirty="0"/>
+          </a:p>
+          <a:p>
+            <a:pPr marL="0" indent="0" algn="ctr">
+              <a:buNone/>
+            </a:pPr>
+            <a:r>
+              <a:rPr lang="fr-FR" sz="2400" dirty="0" smtClean="0"/>
+              <a:t>Lien démo</a:t>
+            </a:r>
+            <a:endParaRPr lang="fr-FR" dirty="0" smtClean="0"/>
+          </a:p>
+        </p:txBody>
+      </p:sp>
+    </p:spTree>
+    <p:extLst>
+      <p:ext uri="{BB962C8B-B14F-4D97-AF65-F5344CB8AC3E}">
+        <p14:creationId xmlns:p14="http://schemas.microsoft.com/office/powerpoint/2010/main" val="3420849559"/>
       </p:ext>
     </p:extLst>
   </p:cSld>

</xml_diff>

<commit_message>
mettre a jour les slides selon les conseils
</commit_message>
<xml_diff>
--- a/annexes/slides-VR_Tourism.pptx
+++ b/annexes/slides-VR_Tourism.pptx
@@ -24,6 +24,7 @@
     <p:sldId id="273" r:id="rId18"/>
     <p:sldId id="274" r:id="rId19"/>
     <p:sldId id="262" r:id="rId20"/>
+    <p:sldId id="275" r:id="rId21"/>
   </p:sldIdLst>
   <p:sldSz cx="12192000" cy="6858000"/>
   <p:notesSz cx="6858000" cy="9144000"/>
@@ -225,7 +226,7 @@
           <a:effectLst/>
           <a:extLst>
             <a:ext uri="{91240B29-F687-4f45-9708-019B960494DF}">
-              <a14:hiddenLine xmlns="" xmlns:a14="http://schemas.microsoft.com/office/drawing/2010/main" w="9525">
+              <a14:hiddenLine xmlns:a14="http://schemas.microsoft.com/office/drawing/2010/main" xmlns="" w="9525">
                 <a:solidFill>
                   <a:srgbClr val="000000"/>
                 </a:solidFill>
@@ -1735,7 +1736,7 @@
           <a:ln/>
           <a:extLst>
             <a:ext uri="{91240B29-F687-4f45-9708-019B960494DF}">
-              <a14:hiddenLine xmlns="" xmlns:a14="http://schemas.microsoft.com/office/drawing/2010/main" w="9525">
+              <a14:hiddenLine xmlns:a14="http://schemas.microsoft.com/office/drawing/2010/main" xmlns="" w="9525">
                 <a:solidFill>
                   <a:srgbClr val="000000"/>
                 </a:solidFill>
@@ -2007,7 +2008,7 @@
           <a:ln/>
           <a:extLst>
             <a:ext uri="{91240B29-F687-4f45-9708-019B960494DF}">
-              <a14:hiddenLine xmlns="" xmlns:a14="http://schemas.microsoft.com/office/drawing/2010/main" w="9525">
+              <a14:hiddenLine xmlns:a14="http://schemas.microsoft.com/office/drawing/2010/main" xmlns="" w="9525">
                 <a:solidFill>
                   <a:srgbClr val="000000"/>
                 </a:solidFill>
@@ -2287,7 +2288,7 @@
           <a:ln/>
           <a:extLst>
             <a:ext uri="{91240B29-F687-4f45-9708-019B960494DF}">
-              <a14:hiddenLine xmlns="" xmlns:a14="http://schemas.microsoft.com/office/drawing/2010/main" w="9525">
+              <a14:hiddenLine xmlns:a14="http://schemas.microsoft.com/office/drawing/2010/main" xmlns="" w="9525">
                 <a:solidFill>
                   <a:srgbClr val="000000"/>
                 </a:solidFill>
@@ -2907,7 +2908,7 @@
           <a:ln/>
           <a:extLst>
             <a:ext uri="{91240B29-F687-4f45-9708-019B960494DF}">
-              <a14:hiddenLine xmlns="" xmlns:a14="http://schemas.microsoft.com/office/drawing/2010/main" w="9525">
+              <a14:hiddenLine xmlns:a14="http://schemas.microsoft.com/office/drawing/2010/main" xmlns="" w="9525">
                 <a:solidFill>
                   <a:srgbClr val="000000"/>
                 </a:solidFill>
@@ -3243,7 +3244,7 @@
           <a:ln/>
           <a:extLst>
             <a:ext uri="{91240B29-F687-4f45-9708-019B960494DF}">
-              <a14:hiddenLine xmlns="" xmlns:a14="http://schemas.microsoft.com/office/drawing/2010/main" w="9525">
+              <a14:hiddenLine xmlns:a14="http://schemas.microsoft.com/office/drawing/2010/main" xmlns="" w="9525">
                 <a:solidFill>
                   <a:srgbClr val="000000"/>
                 </a:solidFill>
@@ -3717,7 +3718,7 @@
           <a:ln/>
           <a:extLst>
             <a:ext uri="{91240B29-F687-4f45-9708-019B960494DF}">
-              <a14:hiddenLine xmlns="" xmlns:a14="http://schemas.microsoft.com/office/drawing/2010/main" w="9525">
+              <a14:hiddenLine xmlns:a14="http://schemas.microsoft.com/office/drawing/2010/main" xmlns="" w="9525">
                 <a:solidFill>
                   <a:srgbClr val="000000"/>
                 </a:solidFill>
@@ -4140,7 +4141,7 @@
           <a:ln/>
           <a:extLst>
             <a:ext uri="{91240B29-F687-4f45-9708-019B960494DF}">
-              <a14:hiddenLine xmlns="" xmlns:a14="http://schemas.microsoft.com/office/drawing/2010/main" w="9525">
+              <a14:hiddenLine xmlns:a14="http://schemas.microsoft.com/office/drawing/2010/main" xmlns="" w="9525">
                 <a:solidFill>
                   <a:srgbClr val="000000"/>
                 </a:solidFill>
@@ -5624,15 +5625,7 @@
                   <a:schemeClr val="tx1"/>
                 </a:solidFill>
               </a:rPr>
-              <a:t>. </a:t>
-            </a:r>
-            <a:r>
-              <a:rPr lang="fr-FR" sz="3000" dirty="0" smtClean="0">
-                <a:solidFill>
-                  <a:schemeClr val="tx1"/>
-                </a:solidFill>
-              </a:rPr>
-              <a:t>(2/3)</a:t>
+              <a:t>. (2/3)</a:t>
             </a:r>
             <a:endParaRPr lang="fr-FR" sz="3000" dirty="0"/>
           </a:p>
@@ -5906,15 +5899,7 @@
             <a:pPr algn="ctr"/>
             <a:r>
               <a:rPr lang="fr-FR" sz="3000" dirty="0" smtClean="0"/>
-              <a:t>Mohamed : Diagramme </a:t>
-            </a:r>
-            <a:r>
-              <a:rPr lang="fr-FR" sz="3000" dirty="0" smtClean="0"/>
-              <a:t>de classe </a:t>
-            </a:r>
-            <a:r>
-              <a:rPr lang="fr-FR" sz="3000" dirty="0" smtClean="0"/>
-              <a:t/>
+              <a:t>Mohamed : Diagramme de classe </a:t>
             </a:r>
             <a:br>
               <a:rPr lang="fr-FR" sz="3000" dirty="0" smtClean="0"/>
@@ -6004,15 +5989,7 @@
           <a:p>
             <a:r>
               <a:rPr lang="fr-FR" dirty="0" smtClean="0"/>
-              <a:t>Gaël : Mise </a:t>
-            </a:r>
-            <a:r>
-              <a:rPr lang="fr-FR" dirty="0" smtClean="0"/>
-              <a:t>en place du </a:t>
-            </a:r>
-            <a:r>
-              <a:rPr lang="fr-FR" dirty="0" smtClean="0"/>
-              <a:t>Serveur (1/4)</a:t>
+              <a:t>Gaël : Mise en place du Serveur (1/4)</a:t>
             </a:r>
             <a:endParaRPr lang="fr-FR" dirty="0"/>
           </a:p>
@@ -6259,11 +6236,7 @@
             </a:r>
             <a:r>
               <a:rPr lang="fr-FR" dirty="0" smtClean="0"/>
-              <a:t>d’un </a:t>
-            </a:r>
-            <a:r>
-              <a:rPr lang="fr-FR" dirty="0" smtClean="0"/>
-              <a:t>Backoffice (3/4)</a:t>
+              <a:t>d’un Backoffice (3/4)</a:t>
             </a:r>
             <a:endParaRPr lang="fr-FR" dirty="0"/>
           </a:p>
@@ -6506,15 +6479,7 @@
             </a:r>
             <a:r>
               <a:rPr lang="fr-FR" dirty="0" smtClean="0"/>
-              <a:t> : La </a:t>
-            </a:r>
-            <a:r>
-              <a:rPr lang="fr-FR" dirty="0" smtClean="0"/>
-              <a:t>réalité </a:t>
-            </a:r>
-            <a:r>
-              <a:rPr lang="fr-FR" dirty="0" smtClean="0"/>
-              <a:t>virtuelle (1/3)</a:t>
+              <a:t> : La réalité virtuelle (1/3)</a:t>
             </a:r>
             <a:endParaRPr lang="fr-FR" dirty="0"/>
           </a:p>
@@ -7494,7 +7459,6 @@
               <a:rPr lang="fr-FR" dirty="0" smtClean="0"/>
               <a:t>.</a:t>
             </a:r>
-            <a:endParaRPr lang="fr-FR" dirty="0" smtClean="0"/>
           </a:p>
         </p:txBody>
       </p:sp>
@@ -7590,7 +7554,6 @@
               <a:rPr lang="fr-FR" dirty="0" smtClean="0"/>
               <a:t>Outils, technologies</a:t>
             </a:r>
-            <a:endParaRPr lang="fr-FR" dirty="0" smtClean="0"/>
           </a:p>
           <a:p>
             <a:r>
@@ -7642,6 +7605,82 @@
     <p:extLst>
       <p:ext uri="{BB962C8B-B14F-4D97-AF65-F5344CB8AC3E}">
         <p14:creationId xmlns:p14="http://schemas.microsoft.com/office/powerpoint/2010/main" val="3805287657"/>
+      </p:ext>
+    </p:extLst>
+  </p:cSld>
+  <p:clrMapOvr>
+    <a:masterClrMapping/>
+  </p:clrMapOvr>
+</p:sld>
+</file>
+
+<file path=ppt/slides/slide20.xml><?xml version="1.0" encoding="utf-8"?>
+<p:sld xmlns:a="http://schemas.openxmlformats.org/drawingml/2006/main" xmlns:r="http://schemas.openxmlformats.org/officeDocument/2006/relationships" xmlns:p="http://schemas.openxmlformats.org/presentationml/2006/main">
+  <p:cSld>
+    <p:spTree>
+      <p:nvGrpSpPr>
+        <p:cNvPr id="1" name=""/>
+        <p:cNvGrpSpPr/>
+        <p:nvPr/>
+      </p:nvGrpSpPr>
+      <p:grpSpPr>
+        <a:xfrm>
+          <a:off x="0" y="0"/>
+          <a:ext cx="0" cy="0"/>
+          <a:chOff x="0" y="0"/>
+          <a:chExt cx="0" cy="0"/>
+        </a:xfrm>
+      </p:grpSpPr>
+      <p:sp>
+        <p:nvSpPr>
+          <p:cNvPr id="2" name="Titre 1"/>
+          <p:cNvSpPr>
+            <a:spLocks noGrp="1"/>
+          </p:cNvSpPr>
+          <p:nvPr>
+            <p:ph type="title"/>
+          </p:nvPr>
+        </p:nvSpPr>
+        <p:spPr/>
+        <p:txBody>
+          <a:bodyPr/>
+          <a:lstStyle/>
+          <a:p>
+            <a:r>
+              <a:rPr lang="fr-FR" dirty="0" smtClean="0"/>
+              <a:t>Conclusion</a:t>
+            </a:r>
+            <a:endParaRPr lang="fr-FR" dirty="0"/>
+          </a:p>
+        </p:txBody>
+      </p:sp>
+      <p:sp>
+        <p:nvSpPr>
+          <p:cNvPr id="3" name="Espace réservé du contenu 2"/>
+          <p:cNvSpPr>
+            <a:spLocks noGrp="1"/>
+          </p:cNvSpPr>
+          <p:nvPr>
+            <p:ph idx="1"/>
+          </p:nvPr>
+        </p:nvSpPr>
+        <p:spPr/>
+        <p:txBody>
+          <a:bodyPr/>
+          <a:lstStyle/>
+          <a:p>
+            <a:r>
+              <a:rPr lang="fr-FR" dirty="0" smtClean="0"/>
+              <a:t>(Parler de la démo, comment cela pourrait évoluer, ce que l’on a apprit)</a:t>
+            </a:r>
+            <a:endParaRPr lang="fr-FR" dirty="0"/>
+          </a:p>
+        </p:txBody>
+      </p:sp>
+    </p:spTree>
+    <p:extLst>
+      <p:ext uri="{BB962C8B-B14F-4D97-AF65-F5344CB8AC3E}">
+        <p14:creationId xmlns:p14="http://schemas.microsoft.com/office/powerpoint/2010/main" val="643386072"/>
       </p:ext>
     </p:extLst>
   </p:cSld>
@@ -7773,7 +7812,11 @@
             </a:r>
             <a:r>
               <a:rPr lang="fr-FR" dirty="0" smtClean="0"/>
-              <a:t>ou d’un autre élément touristique.</a:t>
+              <a:t>ou d’un autre élément </a:t>
+            </a:r>
+            <a:r>
+              <a:rPr lang="fr-FR" dirty="0" smtClean="0"/>
+              <a:t>touristique…</a:t>
             </a:r>
             <a:endParaRPr lang="fr-FR" dirty="0"/>
           </a:p>
@@ -8050,11 +8093,7 @@
             </a:r>
             <a:r>
               <a:rPr lang="fr-FR" dirty="0" smtClean="0"/>
-              <a:t> </a:t>
-            </a:r>
-            <a:r>
-              <a:rPr lang="fr-FR" dirty="0" smtClean="0"/>
-              <a:t>:</a:t>
+              <a:t> :</a:t>
             </a:r>
           </a:p>
           <a:p>
@@ -8075,7 +8114,6 @@
               <a:rPr lang="fr-FR" dirty="0" smtClean="0"/>
               <a:t>Création et implémentation de vidéos VR.</a:t>
             </a:r>
-            <a:endParaRPr lang="fr-FR" dirty="0" smtClean="0"/>
           </a:p>
           <a:p>
             <a:pPr lvl="1"/>
@@ -9450,6 +9488,36 @@
           </a:p>
         </p:txBody>
       </p:sp>
+      <p:sp>
+        <p:nvSpPr>
+          <p:cNvPr id="3" name="ZoneTexte 2"/>
+          <p:cNvSpPr txBox="1"/>
+          <p:nvPr/>
+        </p:nvSpPr>
+        <p:spPr>
+          <a:xfrm>
+            <a:off x="9019309" y="2152996"/>
+            <a:ext cx="1803862" cy="923330"/>
+          </a:xfrm>
+          <a:prstGeom prst="rect">
+            <a:avLst/>
+          </a:prstGeom>
+          <a:noFill/>
+        </p:spPr>
+        <p:txBody>
+          <a:bodyPr wrap="square" rtlCol="0">
+            <a:spAutoFit/>
+          </a:bodyPr>
+          <a:lstStyle/>
+          <a:p>
+            <a:r>
+              <a:rPr lang="fr-FR" dirty="0" smtClean="0"/>
+              <a:t>PLUS DE DETAILS TECHNIQUES</a:t>
+            </a:r>
+            <a:endParaRPr lang="fr-FR" dirty="0"/>
+          </a:p>
+        </p:txBody>
+      </p:sp>
     </p:spTree>
     <p:extLst>
       <p:ext uri="{BB962C8B-B14F-4D97-AF65-F5344CB8AC3E}">

</xml_diff>

<commit_message>
add logo into slides
</commit_message>
<xml_diff>
--- a/annexes/slides-VR_Tourism.pptx
+++ b/annexes/slides-VR_Tourism.pptx
@@ -226,7 +226,7 @@
           <a:effectLst/>
           <a:extLst>
             <a:ext uri="{91240B29-F687-4f45-9708-019B960494DF}">
-              <a14:hiddenLine xmlns:a14="http://schemas.microsoft.com/office/drawing/2010/main" xmlns="" w="9525">
+              <a14:hiddenLine xmlns="" xmlns:a14="http://schemas.microsoft.com/office/drawing/2010/main" w="9525">
                 <a:solidFill>
                   <a:srgbClr val="000000"/>
                 </a:solidFill>
@@ -1736,7 +1736,7 @@
           <a:ln/>
           <a:extLst>
             <a:ext uri="{91240B29-F687-4f45-9708-019B960494DF}">
-              <a14:hiddenLine xmlns:a14="http://schemas.microsoft.com/office/drawing/2010/main" xmlns="" w="9525">
+              <a14:hiddenLine xmlns="" xmlns:a14="http://schemas.microsoft.com/office/drawing/2010/main" w="9525">
                 <a:solidFill>
                   <a:srgbClr val="000000"/>
                 </a:solidFill>
@@ -2008,7 +2008,7 @@
           <a:ln/>
           <a:extLst>
             <a:ext uri="{91240B29-F687-4f45-9708-019B960494DF}">
-              <a14:hiddenLine xmlns:a14="http://schemas.microsoft.com/office/drawing/2010/main" xmlns="" w="9525">
+              <a14:hiddenLine xmlns="" xmlns:a14="http://schemas.microsoft.com/office/drawing/2010/main" w="9525">
                 <a:solidFill>
                   <a:srgbClr val="000000"/>
                 </a:solidFill>
@@ -2288,7 +2288,7 @@
           <a:ln/>
           <a:extLst>
             <a:ext uri="{91240B29-F687-4f45-9708-019B960494DF}">
-              <a14:hiddenLine xmlns:a14="http://schemas.microsoft.com/office/drawing/2010/main" xmlns="" w="9525">
+              <a14:hiddenLine xmlns="" xmlns:a14="http://schemas.microsoft.com/office/drawing/2010/main" w="9525">
                 <a:solidFill>
                   <a:srgbClr val="000000"/>
                 </a:solidFill>
@@ -2908,7 +2908,7 @@
           <a:ln/>
           <a:extLst>
             <a:ext uri="{91240B29-F687-4f45-9708-019B960494DF}">
-              <a14:hiddenLine xmlns:a14="http://schemas.microsoft.com/office/drawing/2010/main" xmlns="" w="9525">
+              <a14:hiddenLine xmlns="" xmlns:a14="http://schemas.microsoft.com/office/drawing/2010/main" w="9525">
                 <a:solidFill>
                   <a:srgbClr val="000000"/>
                 </a:solidFill>
@@ -3244,7 +3244,7 @@
           <a:ln/>
           <a:extLst>
             <a:ext uri="{91240B29-F687-4f45-9708-019B960494DF}">
-              <a14:hiddenLine xmlns:a14="http://schemas.microsoft.com/office/drawing/2010/main" xmlns="" w="9525">
+              <a14:hiddenLine xmlns="" xmlns:a14="http://schemas.microsoft.com/office/drawing/2010/main" w="9525">
                 <a:solidFill>
                   <a:srgbClr val="000000"/>
                 </a:solidFill>
@@ -3718,7 +3718,7 @@
           <a:ln/>
           <a:extLst>
             <a:ext uri="{91240B29-F687-4f45-9708-019B960494DF}">
-              <a14:hiddenLine xmlns:a14="http://schemas.microsoft.com/office/drawing/2010/main" xmlns="" w="9525">
+              <a14:hiddenLine xmlns="" xmlns:a14="http://schemas.microsoft.com/office/drawing/2010/main" w="9525">
                 <a:solidFill>
                   <a:srgbClr val="000000"/>
                 </a:solidFill>
@@ -4141,7 +4141,7 @@
           <a:ln/>
           <a:extLst>
             <a:ext uri="{91240B29-F687-4f45-9708-019B960494DF}">
-              <a14:hiddenLine xmlns:a14="http://schemas.microsoft.com/office/drawing/2010/main" xmlns="" w="9525">
+              <a14:hiddenLine xmlns="" xmlns:a14="http://schemas.microsoft.com/office/drawing/2010/main" w="9525">
                 <a:solidFill>
                   <a:srgbClr val="000000"/>
                 </a:solidFill>
@@ -5421,7 +5421,11 @@
           <a:p>
             <a:r>
               <a:rPr lang="fr-FR" sz="1400" i="1" dirty="0" smtClean="0"/>
-              <a:t>Casque de réalité virtuelle pour le domaine du tourisme</a:t>
+              <a:t>Casque de réalité virtuelle pour le domaine du </a:t>
+            </a:r>
+            <a:r>
+              <a:rPr lang="fr-FR" sz="1400" i="1" dirty="0" smtClean="0"/>
+              <a:t>tourisme </a:t>
             </a:r>
             <a:endParaRPr lang="fr-FR" sz="1400" i="1" dirty="0"/>
           </a:p>
@@ -5538,6 +5542,67 @@
           <a:xfrm>
             <a:off x="810001" y="364429"/>
             <a:ext cx="5139912" cy="3406943"/>
+          </a:xfrm>
+          <a:prstGeom prst="rect">
+            <a:avLst/>
+          </a:prstGeom>
+        </p:spPr>
+      </p:pic>
+      <p:sp>
+        <p:nvSpPr>
+          <p:cNvPr id="6" name="ZoneTexte 5"/>
+          <p:cNvSpPr txBox="1"/>
+          <p:nvPr/>
+        </p:nvSpPr>
+        <p:spPr>
+          <a:xfrm>
+            <a:off x="7498080" y="5682333"/>
+            <a:ext cx="3883921" cy="369332"/>
+          </a:xfrm>
+          <a:prstGeom prst="rect">
+            <a:avLst/>
+          </a:prstGeom>
+          <a:noFill/>
+        </p:spPr>
+        <p:txBody>
+          <a:bodyPr wrap="square" rtlCol="0">
+            <a:spAutoFit/>
+          </a:bodyPr>
+          <a:lstStyle/>
+          <a:p>
+            <a:pPr algn="r"/>
+            <a:r>
+              <a:rPr lang="fr-FR" dirty="0" smtClean="0"/>
+              <a:t>IUT Nice – Sophia-Antipolis</a:t>
+            </a:r>
+            <a:endParaRPr lang="fr-FR" dirty="0"/>
+          </a:p>
+        </p:txBody>
+      </p:sp>
+      <p:pic>
+        <p:nvPicPr>
+          <p:cNvPr id="7" name="Image 6"/>
+          <p:cNvPicPr>
+            <a:picLocks noChangeAspect="1"/>
+          </p:cNvPicPr>
+          <p:nvPr/>
+        </p:nvPicPr>
+        <p:blipFill>
+          <a:blip r:embed="rId3">
+            <a:extLst>
+              <a:ext uri="{28A0092B-C50C-407E-A947-70E740481C1C}">
+                <a14:useLocalDpi xmlns:a14="http://schemas.microsoft.com/office/drawing/2010/main" val="0"/>
+              </a:ext>
+            </a:extLst>
+          </a:blip>
+          <a:stretch>
+            <a:fillRect/>
+          </a:stretch>
+        </p:blipFill>
+        <p:spPr>
+          <a:xfrm>
+            <a:off x="9476997" y="3544554"/>
+            <a:ext cx="1905004" cy="1203962"/>
           </a:xfrm>
           <a:prstGeom prst="rect">
             <a:avLst/>
@@ -7812,11 +7877,7 @@
             </a:r>
             <a:r>
               <a:rPr lang="fr-FR" dirty="0" smtClean="0"/>
-              <a:t>ou d’un autre élément </a:t>
-            </a:r>
-            <a:r>
-              <a:rPr lang="fr-FR" dirty="0" smtClean="0"/>
-              <a:t>touristique…</a:t>
+              <a:t>ou d’un autre élément touristique…</a:t>
             </a:r>
             <a:endParaRPr lang="fr-FR" dirty="0"/>
           </a:p>

</xml_diff>

<commit_message>
ajout slide yanice vf
</commit_message>
<xml_diff>
--- a/annexes/slides-VR_Tourism.pptx
+++ b/annexes/slides-VR_Tourism.pptx
@@ -28,9 +28,10 @@
     <p:sldId id="271" r:id="rId22"/>
     <p:sldId id="272" r:id="rId23"/>
     <p:sldId id="273" r:id="rId24"/>
-    <p:sldId id="274" r:id="rId25"/>
-    <p:sldId id="262" r:id="rId26"/>
-    <p:sldId id="275" r:id="rId27"/>
+    <p:sldId id="283" r:id="rId25"/>
+    <p:sldId id="282" r:id="rId26"/>
+    <p:sldId id="262" r:id="rId27"/>
+    <p:sldId id="275" r:id="rId28"/>
   </p:sldIdLst>
   <p:sldSz cx="12192000" cy="6858000"/>
   <p:notesSz cx="6858000" cy="9144000"/>
@@ -236,7 +237,7 @@
           <a:effectLst/>
           <a:extLst>
             <a:ext uri="{91240B29-F687-4f45-9708-019B960494DF}">
-              <a14:hiddenLine xmlns:a14="http://schemas.microsoft.com/office/drawing/2010/main" xmlns="" w="9525">
+              <a14:hiddenLine xmlns="" xmlns:a14="http://schemas.microsoft.com/office/drawing/2010/main" w="9525">
                 <a:solidFill>
                   <a:srgbClr val="000000"/>
                 </a:solidFill>
@@ -429,7 +430,7 @@
             <a:fld id="{08B9EBBA-996F-894A-B54A-D6246ED52CEA}" type="datetimeFigureOut">
               <a:rPr lang="en-US" dirty="0"/>
               <a:pPr/>
-              <a:t>5/12/2018</a:t>
+              <a:t>5/14/2018</a:t>
             </a:fld>
             <a:endParaRPr lang="en-US" dirty="0"/>
           </a:p>
@@ -744,7 +745,7 @@
             <a:fld id="{18C79C5D-2A6F-F04D-97DA-BEF2467B64E4}" type="datetimeFigureOut">
               <a:rPr lang="en-US" dirty="0"/>
               <a:pPr/>
-              <a:t>5/12/2018</a:t>
+              <a:t>5/14/2018</a:t>
             </a:fld>
             <a:endParaRPr lang="en-US" dirty="0"/>
           </a:p>
@@ -1229,7 +1230,7 @@
             <a:fld id="{8DFA1846-DA80-1C48-A609-854EA85C59AD}" type="datetimeFigureOut">
               <a:rPr lang="en-US" dirty="0"/>
               <a:pPr/>
-              <a:t>5/12/2018</a:t>
+              <a:t>5/14/2018</a:t>
             </a:fld>
             <a:endParaRPr lang="en-US" dirty="0"/>
           </a:p>
@@ -1595,7 +1596,7 @@
             <a:fld id="{FBF54567-0DE4-3F47-BF90-CB84690072F9}" type="datetimeFigureOut">
               <a:rPr lang="en-US" dirty="0"/>
               <a:pPr/>
-              <a:t>5/12/2018</a:t>
+              <a:t>5/14/2018</a:t>
             </a:fld>
             <a:endParaRPr lang="en-US" dirty="0"/>
           </a:p>
@@ -1746,7 +1747,7 @@
           <a:ln/>
           <a:extLst>
             <a:ext uri="{91240B29-F687-4f45-9708-019B960494DF}">
-              <a14:hiddenLine xmlns:a14="http://schemas.microsoft.com/office/drawing/2010/main" xmlns="" w="9525">
+              <a14:hiddenLine xmlns="" xmlns:a14="http://schemas.microsoft.com/office/drawing/2010/main" w="9525">
                 <a:solidFill>
                   <a:srgbClr val="000000"/>
                 </a:solidFill>
@@ -1865,7 +1866,7 @@
             <a:fld id="{C6C52C72-DE31-F449-A4ED-4C594FD91407}" type="datetimeFigureOut">
               <a:rPr lang="en-US" dirty="0"/>
               <a:pPr/>
-              <a:t>5/12/2018</a:t>
+              <a:t>5/14/2018</a:t>
             </a:fld>
             <a:endParaRPr lang="en-US" dirty="0"/>
           </a:p>
@@ -2018,7 +2019,7 @@
           <a:ln/>
           <a:extLst>
             <a:ext uri="{91240B29-F687-4f45-9708-019B960494DF}">
-              <a14:hiddenLine xmlns:a14="http://schemas.microsoft.com/office/drawing/2010/main" xmlns="" w="9525">
+              <a14:hiddenLine xmlns="" xmlns:a14="http://schemas.microsoft.com/office/drawing/2010/main" w="9525">
                 <a:solidFill>
                   <a:srgbClr val="000000"/>
                 </a:solidFill>
@@ -2147,7 +2148,7 @@
             <a:fld id="{ED62726E-379B-B349-9EED-81ED093FA806}" type="datetimeFigureOut">
               <a:rPr lang="en-US" dirty="0"/>
               <a:pPr/>
-              <a:t>5/12/2018</a:t>
+              <a:t>5/14/2018</a:t>
             </a:fld>
             <a:endParaRPr lang="en-US" dirty="0"/>
           </a:p>
@@ -2298,7 +2299,7 @@
           <a:ln/>
           <a:extLst>
             <a:ext uri="{91240B29-F687-4f45-9708-019B960494DF}">
-              <a14:hiddenLine xmlns:a14="http://schemas.microsoft.com/office/drawing/2010/main" xmlns="" w="9525">
+              <a14:hiddenLine xmlns="" xmlns:a14="http://schemas.microsoft.com/office/drawing/2010/main" w="9525">
                 <a:solidFill>
                   <a:srgbClr val="000000"/>
                 </a:solidFill>
@@ -2427,7 +2428,7 @@
             <a:fld id="{9B3A1323-8D79-1946-B0D7-40001CF92E9D}" type="datetimeFigureOut">
               <a:rPr lang="en-US" dirty="0"/>
               <a:pPr/>
-              <a:t>5/12/2018</a:t>
+              <a:t>5/14/2018</a:t>
             </a:fld>
             <a:endParaRPr lang="en-US" dirty="0"/>
           </a:p>
@@ -2767,7 +2768,7 @@
             <a:fld id="{8DFA1846-DA80-1C48-A609-854EA85C59AD}" type="datetimeFigureOut">
               <a:rPr lang="en-US" dirty="0"/>
               <a:pPr/>
-              <a:t>5/12/2018</a:t>
+              <a:t>5/14/2018</a:t>
             </a:fld>
             <a:endParaRPr lang="en-US" dirty="0"/>
           </a:p>
@@ -2918,7 +2919,7 @@
           <a:ln/>
           <a:extLst>
             <a:ext uri="{91240B29-F687-4f45-9708-019B960494DF}">
-              <a14:hiddenLine xmlns:a14="http://schemas.microsoft.com/office/drawing/2010/main" xmlns="" w="9525">
+              <a14:hiddenLine xmlns="" xmlns:a14="http://schemas.microsoft.com/office/drawing/2010/main" w="9525">
                 <a:solidFill>
                   <a:srgbClr val="000000"/>
                 </a:solidFill>
@@ -3103,7 +3104,7 @@
             <a:fld id="{57302355-E14B-8545-A8F8-0FE83CC9D524}" type="datetimeFigureOut">
               <a:rPr lang="en-US" dirty="0"/>
               <a:pPr/>
-              <a:t>5/12/2018</a:t>
+              <a:t>5/14/2018</a:t>
             </a:fld>
             <a:endParaRPr lang="en-US" dirty="0"/>
           </a:p>
@@ -3254,7 +3255,7 @@
           <a:ln/>
           <a:extLst>
             <a:ext uri="{91240B29-F687-4f45-9708-019B960494DF}">
-              <a14:hiddenLine xmlns:a14="http://schemas.microsoft.com/office/drawing/2010/main" xmlns="" w="9525">
+              <a14:hiddenLine xmlns="" xmlns:a14="http://schemas.microsoft.com/office/drawing/2010/main" w="9525">
                 <a:solidFill>
                   <a:srgbClr val="000000"/>
                 </a:solidFill>
@@ -3577,7 +3578,7 @@
             <a:fld id="{02640F58-564D-2B4F-AE67-E407BA4FCF45}" type="datetimeFigureOut">
               <a:rPr lang="en-US" dirty="0"/>
               <a:pPr/>
-              <a:t>5/12/2018</a:t>
+              <a:t>5/14/2018</a:t>
             </a:fld>
             <a:endParaRPr lang="en-US" dirty="0"/>
           </a:p>
@@ -3728,7 +3729,7 @@
           <a:ln/>
           <a:extLst>
             <a:ext uri="{91240B29-F687-4f45-9708-019B960494DF}">
-              <a14:hiddenLine xmlns:a14="http://schemas.microsoft.com/office/drawing/2010/main" xmlns="" w="9525">
+              <a14:hiddenLine xmlns="" xmlns:a14="http://schemas.microsoft.com/office/drawing/2010/main" w="9525">
                 <a:solidFill>
                   <a:srgbClr val="000000"/>
                 </a:solidFill>
@@ -3795,7 +3796,7 @@
             <a:fld id="{F13A34C8-038E-2045-AF43-DF7DBB8E0E9E}" type="datetimeFigureOut">
               <a:rPr lang="en-US" dirty="0"/>
               <a:pPr/>
-              <a:t>5/12/2018</a:t>
+              <a:t>5/14/2018</a:t>
             </a:fld>
             <a:endParaRPr lang="en-US" dirty="0"/>
           </a:p>
@@ -3887,7 +3888,7 @@
             <a:fld id="{8818C68F-D26B-8F47-958C-23B49CF8A634}" type="datetimeFigureOut">
               <a:rPr lang="en-US" dirty="0"/>
               <a:pPr/>
-              <a:t>5/12/2018</a:t>
+              <a:t>5/14/2018</a:t>
             </a:fld>
             <a:endParaRPr lang="en-US" dirty="0"/>
           </a:p>
@@ -4151,7 +4152,7 @@
           <a:ln/>
           <a:extLst>
             <a:ext uri="{91240B29-F687-4f45-9708-019B960494DF}">
-              <a14:hiddenLine xmlns:a14="http://schemas.microsoft.com/office/drawing/2010/main" xmlns="" w="9525">
+              <a14:hiddenLine xmlns="" xmlns:a14="http://schemas.microsoft.com/office/drawing/2010/main" w="9525">
                 <a:solidFill>
                   <a:srgbClr val="000000"/>
                 </a:solidFill>
@@ -4351,7 +4352,7 @@
             <a:fld id="{D0DF5E60-9974-AC48-9591-99C2BB44B7CF}" type="datetimeFigureOut">
               <a:rPr lang="en-US" dirty="0"/>
               <a:pPr/>
-              <a:t>5/12/2018</a:t>
+              <a:t>5/14/2018</a:t>
             </a:fld>
             <a:endParaRPr lang="en-US" dirty="0"/>
           </a:p>
@@ -4661,7 +4662,7 @@
             <a:fld id="{18C79C5D-2A6F-F04D-97DA-BEF2467B64E4}" type="datetimeFigureOut">
               <a:rPr lang="en-US" dirty="0"/>
               <a:pPr/>
-              <a:t>5/12/2018</a:t>
+              <a:t>5/14/2018</a:t>
             </a:fld>
             <a:endParaRPr lang="en-US" dirty="0"/>
           </a:p>
@@ -4928,7 +4929,7 @@
             <a:fld id="{09B482E8-6E0E-1B4F-B1FD-C69DB9E858D9}" type="datetimeFigureOut">
               <a:rPr lang="en-US" dirty="0"/>
               <a:pPr/>
-              <a:t>5/12/2018</a:t>
+              <a:t>5/14/2018</a:t>
             </a:fld>
             <a:endParaRPr lang="en-US" dirty="0"/>
           </a:p>
@@ -7319,11 +7320,7 @@
           <a:p>
             <a:r>
               <a:rPr lang="fr-FR" dirty="0" smtClean="0"/>
-              <a:t>Vérification de la réponse reçu par le serveur</a:t>
-            </a:r>
-            <a:r>
-              <a:rPr lang="fr-FR" dirty="0" smtClean="0"/>
-              <a:t>. Présence lien vidéo.</a:t>
+              <a:t>Vérification de la réponse reçu par le serveur. Présence lien vidéo.</a:t>
             </a:r>
             <a:endParaRPr lang="fr-FR" dirty="0"/>
           </a:p>
@@ -8200,13 +8197,14 @@
           <a:lstStyle/>
           <a:p>
             <a:r>
-              <a:rPr lang="fr-FR" dirty="0" err="1"/>
-              <a:t>Yanice</a:t>
-            </a:r>
-            <a:r>
               <a:rPr lang="fr-FR" dirty="0"/>
-              <a:t> : La réalité virtuelle (1/3)</a:t>
-            </a:r>
+              <a:t>Yanice : La réalité virtuelle (</a:t>
+            </a:r>
+            <a:r>
+              <a:rPr lang="fr-FR" dirty="0" smtClean="0"/>
+              <a:t>1/4)</a:t>
+            </a:r>
+            <a:endParaRPr lang="fr-FR" dirty="0"/>
           </a:p>
         </p:txBody>
       </p:sp>
@@ -8220,7 +8218,12 @@
             <p:ph idx="1"/>
           </p:nvPr>
         </p:nvSpPr>
-        <p:spPr/>
+        <p:spPr>
+          <a:xfrm>
+            <a:off x="810000" y="2829116"/>
+            <a:ext cx="10554574" cy="3636511"/>
+          </a:xfrm>
+        </p:spPr>
         <p:txBody>
           <a:bodyPr/>
           <a:lstStyle/>
@@ -8244,6 +8247,47 @@
           </a:p>
         </p:txBody>
       </p:sp>
+      <p:pic>
+        <p:nvPicPr>
+          <p:cNvPr id="4" name="Picture 4" descr="RÃ©sultat de recherche d'images pour &quot;Virtual reality&quot;"/>
+          <p:cNvPicPr>
+            <a:picLocks noChangeAspect="1" noChangeArrowheads="1"/>
+          </p:cNvPicPr>
+          <p:nvPr/>
+        </p:nvPicPr>
+        <p:blipFill>
+          <a:blip r:embed="rId2">
+            <a:extLst>
+              <a:ext uri="{28A0092B-C50C-407E-A947-70E740481C1C}">
+                <a14:useLocalDpi xmlns:a14="http://schemas.microsoft.com/office/drawing/2010/main" val="0"/>
+              </a:ext>
+            </a:extLst>
+          </a:blip>
+          <a:srcRect/>
+          <a:stretch>
+            <a:fillRect/>
+          </a:stretch>
+        </p:blipFill>
+        <p:spPr bwMode="auto">
+          <a:xfrm>
+            <a:off x="9718420" y="1900410"/>
+            <a:ext cx="2473580" cy="1324929"/>
+          </a:xfrm>
+          <a:prstGeom prst="rect">
+            <a:avLst/>
+          </a:prstGeom>
+          <a:noFill/>
+          <a:extLst>
+            <a:ext uri="{909E8E84-426E-40DD-AFC4-6F175D3DCCD1}">
+              <a14:hiddenFill xmlns:a14="http://schemas.microsoft.com/office/drawing/2010/main">
+                <a:solidFill>
+                  <a:srgbClr val="FFFFFF"/>
+                </a:solidFill>
+              </a14:hiddenFill>
+            </a:ext>
+          </a:extLst>
+        </p:spPr>
+      </p:pic>
     </p:spTree>
     <p:extLst>
       <p:ext uri="{BB962C8B-B14F-4D97-AF65-F5344CB8AC3E}">
@@ -8290,33 +8334,144 @@
           <a:lstStyle/>
           <a:p>
             <a:r>
-              <a:rPr lang="fr-FR" dirty="0" err="1"/>
-              <a:t>Yanice</a:t>
-            </a:r>
-            <a:r>
               <a:rPr lang="fr-FR" dirty="0"/>
-              <a:t> : Technologie </a:t>
-            </a:r>
-            <a:r>
-              <a:rPr lang="fr-FR" dirty="0" err="1"/>
+              <a:t>Yanice : </a:t>
+            </a:r>
+            <a:r>
+              <a:rPr lang="fr-FR" dirty="0" smtClean="0"/>
+              <a:t>Choix et technologies (2/4)</a:t>
+            </a:r>
+            <a:endParaRPr lang="fr-FR" dirty="0"/>
+          </a:p>
+        </p:txBody>
+      </p:sp>
+      <p:sp>
+        <p:nvSpPr>
+          <p:cNvPr id="23" name="Espace réservé du contenu 2"/>
+          <p:cNvSpPr>
+            <a:spLocks noGrp="1"/>
+          </p:cNvSpPr>
+          <p:nvPr>
+            <p:ph idx="1"/>
+          </p:nvPr>
+        </p:nvSpPr>
+        <p:spPr>
+          <a:xfrm>
+            <a:off x="810000" y="3003683"/>
+            <a:ext cx="10554574" cy="3636511"/>
+          </a:xfrm>
+        </p:spPr>
+        <p:txBody>
+          <a:bodyPr/>
+          <a:lstStyle/>
+          <a:p>
+            <a:r>
+              <a:rPr lang="fr-FR" dirty="0" smtClean="0"/>
+              <a:t>La technologie </a:t>
+            </a:r>
+            <a:r>
+              <a:rPr lang="fr-FR" dirty="0" err="1" smtClean="0"/>
               <a:t>Unity</a:t>
             </a:r>
             <a:r>
+              <a:rPr lang="fr-FR" dirty="0" smtClean="0"/>
+              <a:t> était la plus adaptée à nos besoins, </a:t>
+            </a:r>
+            <a:r>
+              <a:rPr lang="fr-FR" dirty="0" err="1" smtClean="0"/>
+              <a:t>Unity</a:t>
+            </a:r>
+            <a:r>
+              <a:rPr lang="fr-FR" dirty="0" smtClean="0"/>
+              <a:t> étant un moteur de jeu vidéo Open Source, il propose un </a:t>
+            </a:r>
+            <a:r>
+              <a:rPr lang="fr-FR" dirty="0" err="1" smtClean="0"/>
+              <a:t>modeling</a:t>
+            </a:r>
+            <a:r>
+              <a:rPr lang="fr-FR" dirty="0" smtClean="0"/>
+              <a:t> complet en terme de 3D, c’est donc grâce à lui que j’ai pu utilisé la VR « réalité virtuelle »</a:t>
+            </a:r>
+          </a:p>
+          <a:p>
+            <a:r>
+              <a:rPr lang="fr-FR" dirty="0" smtClean="0"/>
+              <a:t>Il est directement possible d’ajouter des éléments tels que les </a:t>
+            </a:r>
+            <a:r>
+              <a:rPr lang="fr-FR" dirty="0" err="1" smtClean="0"/>
+              <a:t>Shaders</a:t>
+            </a:r>
+            <a:r>
+              <a:rPr lang="fr-FR" dirty="0" smtClean="0"/>
+              <a:t> et de les coder en (C#)</a:t>
+            </a:r>
+          </a:p>
+          <a:p>
+            <a:r>
+              <a:rPr lang="fr-FR" dirty="0" err="1" smtClean="0"/>
+              <a:t>Unity</a:t>
+            </a:r>
+            <a:r>
+              <a:rPr lang="fr-FR" dirty="0" smtClean="0"/>
+              <a:t> m’a permis d’utiliser certains de ces outils tels que : </a:t>
+            </a:r>
+          </a:p>
+          <a:p>
+            <a:pPr marL="0" indent="0">
+              <a:buNone/>
+            </a:pPr>
+            <a:r>
               <a:rPr lang="fr-FR" dirty="0"/>
-              <a:t> (2/3)</a:t>
-            </a:r>
+              <a:t>	</a:t>
+            </a:r>
+            <a:r>
+              <a:rPr lang="fr-FR" dirty="0" smtClean="0"/>
+              <a:t>- VR/SDK/</a:t>
+            </a:r>
+            <a:r>
+              <a:rPr lang="fr-FR" dirty="0" err="1" smtClean="0"/>
+              <a:t>Sphering</a:t>
+            </a:r>
+            <a:r>
+              <a:rPr lang="fr-FR" dirty="0" smtClean="0"/>
+              <a:t>/Camera/</a:t>
+            </a:r>
+            <a:r>
+              <a:rPr lang="fr-FR" dirty="0" err="1" smtClean="0"/>
+              <a:t>Directional</a:t>
+            </a:r>
+            <a:r>
+              <a:rPr lang="fr-FR" dirty="0" smtClean="0"/>
+              <a:t> light/</a:t>
+            </a:r>
+            <a:r>
+              <a:rPr lang="fr-FR" dirty="0" err="1" smtClean="0"/>
+              <a:t>Scenes</a:t>
+            </a:r>
+            <a:r>
+              <a:rPr lang="fr-FR" dirty="0" smtClean="0"/>
+              <a:t>/</a:t>
+            </a:r>
+            <a:r>
+              <a:rPr lang="fr-FR" dirty="0" err="1" smtClean="0"/>
+              <a:t>Videos</a:t>
+            </a:r>
+            <a:endParaRPr lang="fr-FR" dirty="0" smtClean="0"/>
+          </a:p>
+          <a:p>
+            <a:endParaRPr lang="fr-FR" dirty="0"/>
           </a:p>
         </p:txBody>
       </p:sp>
       <p:pic>
         <p:nvPicPr>
-          <p:cNvPr id="1026" name="Picture 2" descr="RÃ©sultat de recherche d'images pour &quot;Casque VR&quot;"/>
+          <p:cNvPr id="2050" name="Picture 2" descr="RÃ©sultat de recherche d'images pour &quot;Unity&quot;"/>
           <p:cNvPicPr>
-            <a:picLocks noGrp="1" noChangeAspect="1" noChangeArrowheads="1"/>
+            <a:picLocks noChangeAspect="1" noChangeArrowheads="1"/>
           </p:cNvPicPr>
-          <p:nvPr>
-            <p:ph idx="1"/>
-          </p:nvPr>
+          <p:nvPr/>
         </p:nvPicPr>
         <p:blipFill>
           <a:blip r:embed="rId2">
@@ -8333,8 +8488,8 @@
         </p:blipFill>
         <p:spPr bwMode="auto">
           <a:xfrm>
-            <a:off x="7993229" y="2880510"/>
-            <a:ext cx="1728515" cy="1152344"/>
+            <a:off x="9836572" y="1917035"/>
+            <a:ext cx="2355428" cy="1324929"/>
           </a:xfrm>
           <a:prstGeom prst="rect">
             <a:avLst/>
@@ -8353,7 +8508,7 @@
       </p:pic>
       <p:pic>
         <p:nvPicPr>
-          <p:cNvPr id="1028" name="Picture 4" descr="RÃ©sultat de recherche d'images pour &quot;Unity&quot;"/>
+          <p:cNvPr id="2052" name="Picture 4" descr="RÃ©sultat de recherche d'images pour &quot;Virtual reality&quot;"/>
           <p:cNvPicPr>
             <a:picLocks noChangeAspect="1" noChangeArrowheads="1"/>
           </p:cNvPicPr>
@@ -8374,8 +8529,8 @@
         </p:blipFill>
         <p:spPr bwMode="auto">
           <a:xfrm>
-            <a:off x="244733" y="2826327"/>
-            <a:ext cx="2460941" cy="1363287"/>
+            <a:off x="7249540" y="1917035"/>
+            <a:ext cx="2473580" cy="1324929"/>
           </a:xfrm>
           <a:prstGeom prst="rect">
             <a:avLst/>
@@ -8392,555 +8547,6 @@
           </a:extLst>
         </p:spPr>
       </p:pic>
-      <p:sp>
-        <p:nvSpPr>
-          <p:cNvPr id="4" name="Flèche droite 3"/>
-          <p:cNvSpPr/>
-          <p:nvPr/>
-        </p:nvSpPr>
-        <p:spPr>
-          <a:xfrm>
-            <a:off x="2810125" y="3444166"/>
-            <a:ext cx="397020" cy="121991"/>
-          </a:xfrm>
-          <a:prstGeom prst="rightArrow">
-            <a:avLst/>
-          </a:prstGeom>
-        </p:spPr>
-        <p:style>
-          <a:lnRef idx="2">
-            <a:schemeClr val="accent1">
-              <a:shade val="50000"/>
-            </a:schemeClr>
-          </a:lnRef>
-          <a:fillRef idx="1">
-            <a:schemeClr val="accent1"/>
-          </a:fillRef>
-          <a:effectRef idx="0">
-            <a:schemeClr val="accent1"/>
-          </a:effectRef>
-          <a:fontRef idx="minor">
-            <a:schemeClr val="lt1"/>
-          </a:fontRef>
-        </p:style>
-        <p:txBody>
-          <a:bodyPr rtlCol="0" anchor="ctr"/>
-          <a:lstStyle/>
-          <a:p>
-            <a:pPr algn="ctr"/>
-            <a:endParaRPr lang="fr-FR"/>
-          </a:p>
-        </p:txBody>
-      </p:sp>
-      <p:pic>
-        <p:nvPicPr>
-          <p:cNvPr id="1030" name="Picture 6" descr="RÃ©sultat de recherche d'images pour &quot;Sphere&quot;"/>
-          <p:cNvPicPr>
-            <a:picLocks noChangeAspect="1" noChangeArrowheads="1"/>
-          </p:cNvPicPr>
-          <p:nvPr/>
-        </p:nvPicPr>
-        <p:blipFill>
-          <a:blip r:embed="rId4">
-            <a:extLst>
-              <a:ext uri="{28A0092B-C50C-407E-A947-70E740481C1C}">
-                <a14:useLocalDpi xmlns:a14="http://schemas.microsoft.com/office/drawing/2010/main" val="0"/>
-              </a:ext>
-            </a:extLst>
-          </a:blip>
-          <a:srcRect/>
-          <a:stretch>
-            <a:fillRect/>
-          </a:stretch>
-        </p:blipFill>
-        <p:spPr bwMode="auto">
-          <a:xfrm>
-            <a:off x="4955161" y="2826327"/>
-            <a:ext cx="1461338" cy="1363287"/>
-          </a:xfrm>
-          <a:prstGeom prst="rect">
-            <a:avLst/>
-          </a:prstGeom>
-          <a:noFill/>
-          <a:extLst>
-            <a:ext uri="{909E8E84-426E-40DD-AFC4-6F175D3DCCD1}">
-              <a14:hiddenFill xmlns:a14="http://schemas.microsoft.com/office/drawing/2010/main">
-                <a:solidFill>
-                  <a:srgbClr val="FFFFFF"/>
-                </a:solidFill>
-              </a14:hiddenFill>
-            </a:ext>
-          </a:extLst>
-        </p:spPr>
-      </p:pic>
-      <p:sp>
-        <p:nvSpPr>
-          <p:cNvPr id="5" name="ZoneTexte 4"/>
-          <p:cNvSpPr txBox="1"/>
-          <p:nvPr/>
-        </p:nvSpPr>
-        <p:spPr>
-          <a:xfrm>
-            <a:off x="668954" y="2450233"/>
-            <a:ext cx="1640193" cy="584775"/>
-          </a:xfrm>
-          <a:prstGeom prst="rect">
-            <a:avLst/>
-          </a:prstGeom>
-          <a:noFill/>
-        </p:spPr>
-        <p:txBody>
-          <a:bodyPr wrap="none" rtlCol="0">
-            <a:spAutoFit/>
-          </a:bodyPr>
-          <a:lstStyle/>
-          <a:p>
-            <a:r>
-              <a:rPr lang="fr-FR" sz="1600" dirty="0"/>
-              <a:t>IDE / </a:t>
-            </a:r>
-            <a:r>
-              <a:rPr lang="fr-FR" sz="1600" dirty="0" err="1"/>
-              <a:t>Modeling</a:t>
-            </a:r>
-            <a:endParaRPr lang="fr-FR" sz="1600" dirty="0"/>
-          </a:p>
-          <a:p>
-            <a:endParaRPr lang="fr-FR" sz="1600" dirty="0"/>
-          </a:p>
-        </p:txBody>
-      </p:sp>
-      <p:pic>
-        <p:nvPicPr>
-          <p:cNvPr id="6" name="Image 5"/>
-          <p:cNvPicPr>
-            <a:picLocks noChangeAspect="1"/>
-          </p:cNvPicPr>
-          <p:nvPr/>
-        </p:nvPicPr>
-        <p:blipFill>
-          <a:blip r:embed="rId5"/>
-          <a:stretch>
-            <a:fillRect/>
-          </a:stretch>
-        </p:blipFill>
-        <p:spPr>
-          <a:xfrm>
-            <a:off x="5328820" y="5474896"/>
-            <a:ext cx="647700" cy="733425"/>
-          </a:xfrm>
-          <a:prstGeom prst="rect">
-            <a:avLst/>
-          </a:prstGeom>
-        </p:spPr>
-      </p:pic>
-      <p:sp>
-        <p:nvSpPr>
-          <p:cNvPr id="10" name="Flèche droite 9"/>
-          <p:cNvSpPr/>
-          <p:nvPr/>
-        </p:nvSpPr>
-        <p:spPr>
-          <a:xfrm rot="5400000">
-            <a:off x="5257179" y="4601715"/>
-            <a:ext cx="815885" cy="174566"/>
-          </a:xfrm>
-          <a:prstGeom prst="rightArrow">
-            <a:avLst/>
-          </a:prstGeom>
-        </p:spPr>
-        <p:style>
-          <a:lnRef idx="2">
-            <a:schemeClr val="accent1">
-              <a:shade val="50000"/>
-            </a:schemeClr>
-          </a:lnRef>
-          <a:fillRef idx="1">
-            <a:schemeClr val="accent1"/>
-          </a:fillRef>
-          <a:effectRef idx="0">
-            <a:schemeClr val="accent1"/>
-          </a:effectRef>
-          <a:fontRef idx="minor">
-            <a:schemeClr val="lt1"/>
-          </a:fontRef>
-        </p:style>
-        <p:txBody>
-          <a:bodyPr rtlCol="0" anchor="ctr"/>
-          <a:lstStyle/>
-          <a:p>
-            <a:pPr algn="ctr"/>
-            <a:endParaRPr lang="fr-FR"/>
-          </a:p>
-        </p:txBody>
-      </p:sp>
-      <p:pic>
-        <p:nvPicPr>
-          <p:cNvPr id="1032" name="Picture 8" descr="RÃ©sultat de recherche d'images pour &quot;Mp4&quot;"/>
-          <p:cNvPicPr>
-            <a:picLocks noChangeAspect="1" noChangeArrowheads="1"/>
-          </p:cNvPicPr>
-          <p:nvPr/>
-        </p:nvPicPr>
-        <p:blipFill>
-          <a:blip r:embed="rId6">
-            <a:extLst>
-              <a:ext uri="{28A0092B-C50C-407E-A947-70E740481C1C}">
-                <a14:useLocalDpi xmlns:a14="http://schemas.microsoft.com/office/drawing/2010/main" val="0"/>
-              </a:ext>
-            </a:extLst>
-          </a:blip>
-          <a:srcRect/>
-          <a:stretch>
-            <a:fillRect/>
-          </a:stretch>
-        </p:blipFill>
-        <p:spPr bwMode="auto">
-          <a:xfrm>
-            <a:off x="3311595" y="2983084"/>
-            <a:ext cx="1049770" cy="1049770"/>
-          </a:xfrm>
-          <a:prstGeom prst="rect">
-            <a:avLst/>
-          </a:prstGeom>
-          <a:noFill/>
-          <a:extLst>
-            <a:ext uri="{909E8E84-426E-40DD-AFC4-6F175D3DCCD1}">
-              <a14:hiddenFill xmlns:a14="http://schemas.microsoft.com/office/drawing/2010/main">
-                <a:solidFill>
-                  <a:srgbClr val="FFFFFF"/>
-                </a:solidFill>
-              </a14:hiddenFill>
-            </a:ext>
-          </a:extLst>
-        </p:spPr>
-      </p:pic>
-      <p:sp>
-        <p:nvSpPr>
-          <p:cNvPr id="16" name="Flèche droite 15"/>
-          <p:cNvSpPr/>
-          <p:nvPr/>
-        </p:nvSpPr>
-        <p:spPr>
-          <a:xfrm>
-            <a:off x="4465815" y="3444166"/>
-            <a:ext cx="384895" cy="121991"/>
-          </a:xfrm>
-          <a:prstGeom prst="rightArrow">
-            <a:avLst/>
-          </a:prstGeom>
-        </p:spPr>
-        <p:style>
-          <a:lnRef idx="2">
-            <a:schemeClr val="accent1">
-              <a:shade val="50000"/>
-            </a:schemeClr>
-          </a:lnRef>
-          <a:fillRef idx="1">
-            <a:schemeClr val="accent1"/>
-          </a:fillRef>
-          <a:effectRef idx="0">
-            <a:schemeClr val="accent1"/>
-          </a:effectRef>
-          <a:fontRef idx="minor">
-            <a:schemeClr val="lt1"/>
-          </a:fontRef>
-        </p:style>
-        <p:txBody>
-          <a:bodyPr rtlCol="0" anchor="ctr"/>
-          <a:lstStyle/>
-          <a:p>
-            <a:pPr algn="ctr"/>
-            <a:endParaRPr lang="fr-FR"/>
-          </a:p>
-        </p:txBody>
-      </p:sp>
-      <p:sp>
-        <p:nvSpPr>
-          <p:cNvPr id="17" name="Flèche droite 16"/>
-          <p:cNvSpPr/>
-          <p:nvPr/>
-        </p:nvSpPr>
-        <p:spPr>
-          <a:xfrm>
-            <a:off x="6520950" y="3437463"/>
-            <a:ext cx="1367828" cy="128694"/>
-          </a:xfrm>
-          <a:prstGeom prst="rightArrow">
-            <a:avLst/>
-          </a:prstGeom>
-        </p:spPr>
-        <p:style>
-          <a:lnRef idx="2">
-            <a:schemeClr val="accent1">
-              <a:shade val="50000"/>
-            </a:schemeClr>
-          </a:lnRef>
-          <a:fillRef idx="1">
-            <a:schemeClr val="accent1"/>
-          </a:fillRef>
-          <a:effectRef idx="0">
-            <a:schemeClr val="accent1"/>
-          </a:effectRef>
-          <a:fontRef idx="minor">
-            <a:schemeClr val="lt1"/>
-          </a:fontRef>
-        </p:style>
-        <p:txBody>
-          <a:bodyPr rtlCol="0" anchor="ctr"/>
-          <a:lstStyle/>
-          <a:p>
-            <a:pPr algn="ctr"/>
-            <a:endParaRPr lang="fr-FR"/>
-          </a:p>
-        </p:txBody>
-      </p:sp>
-      <p:sp>
-        <p:nvSpPr>
-          <p:cNvPr id="18" name="ZoneTexte 17"/>
-          <p:cNvSpPr txBox="1"/>
-          <p:nvPr/>
-        </p:nvSpPr>
-        <p:spPr>
-          <a:xfrm>
-            <a:off x="5241637" y="5167119"/>
-            <a:ext cx="888385" cy="615553"/>
-          </a:xfrm>
-          <a:prstGeom prst="rect">
-            <a:avLst/>
-          </a:prstGeom>
-          <a:noFill/>
-        </p:spPr>
-        <p:txBody>
-          <a:bodyPr wrap="none" rtlCol="0">
-            <a:spAutoFit/>
-          </a:bodyPr>
-          <a:lstStyle/>
-          <a:p>
-            <a:r>
-              <a:rPr lang="fr-FR" sz="1600" dirty="0" err="1"/>
-              <a:t>Shader</a:t>
-            </a:r>
-            <a:endParaRPr lang="fr-FR" sz="1600" dirty="0"/>
-          </a:p>
-          <a:p>
-            <a:endParaRPr lang="fr-FR" dirty="0"/>
-          </a:p>
-        </p:txBody>
-      </p:sp>
-      <p:sp>
-        <p:nvSpPr>
-          <p:cNvPr id="19" name="ZoneTexte 18"/>
-          <p:cNvSpPr txBox="1"/>
-          <p:nvPr/>
-        </p:nvSpPr>
-        <p:spPr>
-          <a:xfrm>
-            <a:off x="5205569" y="2463922"/>
-            <a:ext cx="880369" cy="615553"/>
-          </a:xfrm>
-          <a:prstGeom prst="rect">
-            <a:avLst/>
-          </a:prstGeom>
-          <a:noFill/>
-        </p:spPr>
-        <p:txBody>
-          <a:bodyPr wrap="none" rtlCol="0">
-            <a:spAutoFit/>
-          </a:bodyPr>
-          <a:lstStyle/>
-          <a:p>
-            <a:r>
-              <a:rPr lang="fr-FR" sz="1600" dirty="0"/>
-              <a:t>Sphère</a:t>
-            </a:r>
-          </a:p>
-          <a:p>
-            <a:endParaRPr lang="fr-FR" dirty="0"/>
-          </a:p>
-        </p:txBody>
-      </p:sp>
-      <p:sp>
-        <p:nvSpPr>
-          <p:cNvPr id="20" name="ZoneTexte 19"/>
-          <p:cNvSpPr txBox="1"/>
-          <p:nvPr/>
-        </p:nvSpPr>
-        <p:spPr>
-          <a:xfrm>
-            <a:off x="3413510" y="2591267"/>
-            <a:ext cx="779381" cy="615553"/>
-          </a:xfrm>
-          <a:prstGeom prst="rect">
-            <a:avLst/>
-          </a:prstGeom>
-          <a:noFill/>
-        </p:spPr>
-        <p:txBody>
-          <a:bodyPr wrap="none" rtlCol="0">
-            <a:spAutoFit/>
-          </a:bodyPr>
-          <a:lstStyle/>
-          <a:p>
-            <a:r>
-              <a:rPr lang="fr-FR" sz="1600" dirty="0"/>
-              <a:t>Vidéo</a:t>
-            </a:r>
-          </a:p>
-          <a:p>
-            <a:endParaRPr lang="fr-FR" dirty="0"/>
-          </a:p>
-        </p:txBody>
-      </p:sp>
-      <p:sp>
-        <p:nvSpPr>
-          <p:cNvPr id="21" name="ZoneTexte 20"/>
-          <p:cNvSpPr txBox="1"/>
-          <p:nvPr/>
-        </p:nvSpPr>
-        <p:spPr>
-          <a:xfrm>
-            <a:off x="8547786" y="2503161"/>
-            <a:ext cx="453970" cy="615553"/>
-          </a:xfrm>
-          <a:prstGeom prst="rect">
-            <a:avLst/>
-          </a:prstGeom>
-          <a:noFill/>
-        </p:spPr>
-        <p:txBody>
-          <a:bodyPr wrap="none" rtlCol="0">
-            <a:spAutoFit/>
-          </a:bodyPr>
-          <a:lstStyle/>
-          <a:p>
-            <a:r>
-              <a:rPr lang="fr-FR" sz="1600" dirty="0"/>
-              <a:t>VR</a:t>
-            </a:r>
-          </a:p>
-          <a:p>
-            <a:endParaRPr lang="fr-FR" dirty="0"/>
-          </a:p>
-        </p:txBody>
-      </p:sp>
-      <p:pic>
-        <p:nvPicPr>
-          <p:cNvPr id="1040" name="Picture 16" descr="RÃ©sultat de recherche d'images pour &quot;youtube&quot;"/>
-          <p:cNvPicPr>
-            <a:picLocks noChangeAspect="1" noChangeArrowheads="1"/>
-          </p:cNvPicPr>
-          <p:nvPr/>
-        </p:nvPicPr>
-        <p:blipFill>
-          <a:blip r:embed="rId7">
-            <a:extLst>
-              <a:ext uri="{28A0092B-C50C-407E-A947-70E740481C1C}">
-                <a14:useLocalDpi xmlns:a14="http://schemas.microsoft.com/office/drawing/2010/main" val="0"/>
-              </a:ext>
-            </a:extLst>
-          </a:blip>
-          <a:srcRect/>
-          <a:stretch>
-            <a:fillRect/>
-          </a:stretch>
-        </p:blipFill>
-        <p:spPr bwMode="auto">
-          <a:xfrm>
-            <a:off x="8480011" y="5530500"/>
-            <a:ext cx="933324" cy="622216"/>
-          </a:xfrm>
-          <a:prstGeom prst="rect">
-            <a:avLst/>
-          </a:prstGeom>
-          <a:noFill/>
-          <a:extLst>
-            <a:ext uri="{909E8E84-426E-40DD-AFC4-6F175D3DCCD1}">
-              <a14:hiddenFill xmlns:a14="http://schemas.microsoft.com/office/drawing/2010/main">
-                <a:solidFill>
-                  <a:srgbClr val="FFFFFF"/>
-                </a:solidFill>
-              </a14:hiddenFill>
-            </a:ext>
-          </a:extLst>
-        </p:spPr>
-      </p:pic>
-      <p:sp>
-        <p:nvSpPr>
-          <p:cNvPr id="26" name="Flèche droite 25"/>
-          <p:cNvSpPr/>
-          <p:nvPr/>
-        </p:nvSpPr>
-        <p:spPr>
-          <a:xfrm rot="5400000">
-            <a:off x="8567241" y="4433867"/>
-            <a:ext cx="777326" cy="155823"/>
-          </a:xfrm>
-          <a:prstGeom prst="rightArrow">
-            <a:avLst/>
-          </a:prstGeom>
-        </p:spPr>
-        <p:style>
-          <a:lnRef idx="2">
-            <a:schemeClr val="accent1">
-              <a:shade val="50000"/>
-            </a:schemeClr>
-          </a:lnRef>
-          <a:fillRef idx="1">
-            <a:schemeClr val="accent1"/>
-          </a:fillRef>
-          <a:effectRef idx="0">
-            <a:schemeClr val="accent1"/>
-          </a:effectRef>
-          <a:fontRef idx="minor">
-            <a:schemeClr val="lt1"/>
-          </a:fontRef>
-        </p:style>
-        <p:txBody>
-          <a:bodyPr rtlCol="0" anchor="ctr"/>
-          <a:lstStyle/>
-          <a:p>
-            <a:pPr algn="ctr"/>
-            <a:endParaRPr lang="fr-FR"/>
-          </a:p>
-        </p:txBody>
-      </p:sp>
-      <p:sp>
-        <p:nvSpPr>
-          <p:cNvPr id="27" name="ZoneTexte 26"/>
-          <p:cNvSpPr txBox="1"/>
-          <p:nvPr/>
-        </p:nvSpPr>
-        <p:spPr>
-          <a:xfrm>
-            <a:off x="8429545" y="4945725"/>
-            <a:ext cx="1034257" cy="584775"/>
-          </a:xfrm>
-          <a:prstGeom prst="rect">
-            <a:avLst/>
-          </a:prstGeom>
-          <a:noFill/>
-        </p:spPr>
-        <p:txBody>
-          <a:bodyPr wrap="none" rtlCol="0">
-            <a:spAutoFit/>
-          </a:bodyPr>
-          <a:lstStyle/>
-          <a:p>
-            <a:r>
-              <a:rPr lang="fr-FR" sz="1600" dirty="0"/>
-              <a:t>Injection</a:t>
-            </a:r>
-          </a:p>
-          <a:p>
-            <a:r>
-              <a:rPr lang="fr-FR" sz="1600" dirty="0" err="1"/>
-              <a:t>Youtube</a:t>
-            </a:r>
-            <a:endParaRPr lang="fr-FR" sz="1600" dirty="0"/>
-          </a:p>
-        </p:txBody>
-      </p:sp>
     </p:spTree>
     <p:extLst>
       <p:ext uri="{BB962C8B-B14F-4D97-AF65-F5344CB8AC3E}">
@@ -8987,62 +8593,349 @@
           <a:lstStyle/>
           <a:p>
             <a:r>
-              <a:rPr lang="fr-FR" dirty="0" err="1"/>
-              <a:t>Yanice</a:t>
-            </a:r>
-            <a:r>
-              <a:rPr lang="fr-FR" dirty="0"/>
-              <a:t> : Problèmes rencontrés (3/3)</a:t>
-            </a:r>
-          </a:p>
-        </p:txBody>
-      </p:sp>
-      <p:sp>
-        <p:nvSpPr>
-          <p:cNvPr id="3" name="Espace réservé du contenu 2"/>
-          <p:cNvSpPr>
-            <a:spLocks noGrp="1"/>
-          </p:cNvSpPr>
+              <a:rPr lang="fr-FR" dirty="0" smtClean="0"/>
+              <a:t>Yanice : Les outils </a:t>
+            </a:r>
+            <a:r>
+              <a:rPr lang="fr-FR" dirty="0" err="1" smtClean="0"/>
+              <a:t>Unity</a:t>
+            </a:r>
+            <a:r>
+              <a:rPr lang="fr-FR" dirty="0" smtClean="0"/>
+              <a:t> (3/4)</a:t>
+            </a:r>
+            <a:endParaRPr lang="fr-FR" dirty="0"/>
+          </a:p>
+        </p:txBody>
+      </p:sp>
+      <p:pic>
+        <p:nvPicPr>
+          <p:cNvPr id="3074" name="Picture 2" descr="RÃ©sultat de recherche d'images pour &quot;Interface Unity&quot;"/>
+          <p:cNvPicPr>
+            <a:picLocks noGrp="1" noChangeAspect="1" noChangeArrowheads="1"/>
+          </p:cNvPicPr>
           <p:nvPr>
             <p:ph idx="1"/>
           </p:nvPr>
-        </p:nvSpPr>
-        <p:spPr/>
-        <p:txBody>
-          <a:bodyPr/>
-          <a:lstStyle/>
-          <a:p>
-            <a:r>
-              <a:rPr lang="fr-FR" dirty="0"/>
-              <a:t>Appréhension UNITY.</a:t>
-            </a:r>
-          </a:p>
-          <a:p>
-            <a:r>
-              <a:rPr lang="fr-FR" dirty="0"/>
-              <a:t>Problème de lecture après leur passage en VR.</a:t>
-            </a:r>
-          </a:p>
-          <a:p>
-            <a:r>
-              <a:rPr lang="fr-FR" dirty="0"/>
-              <a:t>Injection </a:t>
-            </a:r>
-            <a:r>
-              <a:rPr lang="fr-FR" dirty="0" err="1"/>
-              <a:t>youtube</a:t>
-            </a:r>
-            <a:r>
-              <a:rPr lang="fr-FR" dirty="0"/>
-              <a:t>.</a:t>
-            </a:r>
+        </p:nvPicPr>
+        <p:blipFill>
+          <a:blip r:embed="rId2">
+            <a:extLst>
+              <a:ext uri="{28A0092B-C50C-407E-A947-70E740481C1C}">
+                <a14:useLocalDpi xmlns:a14="http://schemas.microsoft.com/office/drawing/2010/main" val="0"/>
+              </a:ext>
+            </a:extLst>
+          </a:blip>
+          <a:srcRect/>
+          <a:stretch>
+            <a:fillRect/>
+          </a:stretch>
+        </p:blipFill>
+        <p:spPr bwMode="auto">
+          <a:xfrm>
+            <a:off x="6095999" y="2654763"/>
+            <a:ext cx="6009382" cy="3380278"/>
+          </a:xfrm>
+          <a:prstGeom prst="rect">
+            <a:avLst/>
+          </a:prstGeom>
+          <a:noFill/>
+          <a:extLst>
+            <a:ext uri="{909E8E84-426E-40DD-AFC4-6F175D3DCCD1}">
+              <a14:hiddenFill xmlns:a14="http://schemas.microsoft.com/office/drawing/2010/main">
+                <a:solidFill>
+                  <a:srgbClr val="FFFFFF"/>
+                </a:solidFill>
+              </a14:hiddenFill>
+            </a:ext>
+          </a:extLst>
+        </p:spPr>
+      </p:pic>
+      <p:sp>
+        <p:nvSpPr>
+          <p:cNvPr id="6" name="Espace réservé du contenu 2"/>
+          <p:cNvSpPr txBox="1">
+            <a:spLocks/>
+          </p:cNvSpPr>
+          <p:nvPr/>
+        </p:nvSpPr>
+        <p:spPr>
+          <a:xfrm>
+            <a:off x="810000" y="3169937"/>
+            <a:ext cx="5050473" cy="3031358"/>
+          </a:xfrm>
+          <a:prstGeom prst="rect">
+            <a:avLst/>
+          </a:prstGeom>
+          <a:effectLst>
+            <a:outerShdw blurRad="50800" dir="14400000">
+              <a:srgbClr val="000000">
+                <a:alpha val="40000"/>
+              </a:srgbClr>
+            </a:outerShdw>
+          </a:effectLst>
+        </p:spPr>
+        <p:txBody>
+          <a:bodyPr vert="horz" lIns="91440" tIns="45720" rIns="91440" bIns="45720" rtlCol="0" anchor="ctr">
+            <a:normAutofit lnSpcReduction="10000"/>
+          </a:bodyPr>
+          <a:lstStyle>
+            <a:lvl1pPr marL="342900" indent="-342900" algn="l" defTabSz="457200" rtl="0" eaLnBrk="1" latinLnBrk="0" hangingPunct="1">
+              <a:spcBef>
+                <a:spcPct val="20000"/>
+              </a:spcBef>
+              <a:spcAft>
+                <a:spcPts val="600"/>
+              </a:spcAft>
+              <a:buClr>
+                <a:schemeClr val="accent1"/>
+              </a:buClr>
+              <a:buFont typeface="Wingdings 2" charset="2"/>
+              <a:buChar char=""/>
+              <a:defRPr sz="1800" kern="1200">
+                <a:solidFill>
+                  <a:schemeClr val="tx1"/>
+                </a:solidFill>
+                <a:latin typeface="+mn-lt"/>
+                <a:ea typeface="+mn-ea"/>
+                <a:cs typeface="+mn-cs"/>
+              </a:defRPr>
+            </a:lvl1pPr>
+            <a:lvl2pPr marL="742950" indent="-285750" algn="l" defTabSz="457200" rtl="0" eaLnBrk="1" latinLnBrk="0" hangingPunct="1">
+              <a:spcBef>
+                <a:spcPct val="20000"/>
+              </a:spcBef>
+              <a:spcAft>
+                <a:spcPts val="600"/>
+              </a:spcAft>
+              <a:buClr>
+                <a:schemeClr val="accent1"/>
+              </a:buClr>
+              <a:buFont typeface="Wingdings 2" charset="2"/>
+              <a:buChar char=""/>
+              <a:defRPr sz="1600" kern="1200">
+                <a:solidFill>
+                  <a:schemeClr val="tx1"/>
+                </a:solidFill>
+                <a:latin typeface="+mn-lt"/>
+                <a:ea typeface="+mn-ea"/>
+                <a:cs typeface="+mn-cs"/>
+              </a:defRPr>
+            </a:lvl2pPr>
+            <a:lvl3pPr marL="1143000" indent="-228600" algn="l" defTabSz="457200" rtl="0" eaLnBrk="1" latinLnBrk="0" hangingPunct="1">
+              <a:spcBef>
+                <a:spcPct val="20000"/>
+              </a:spcBef>
+              <a:spcAft>
+                <a:spcPts val="600"/>
+              </a:spcAft>
+              <a:buClr>
+                <a:schemeClr val="accent1"/>
+              </a:buClr>
+              <a:buFont typeface="Wingdings 2" charset="2"/>
+              <a:buChar char=""/>
+              <a:defRPr sz="1400" kern="1200">
+                <a:solidFill>
+                  <a:schemeClr val="tx1"/>
+                </a:solidFill>
+                <a:latin typeface="+mn-lt"/>
+                <a:ea typeface="+mn-ea"/>
+                <a:cs typeface="+mn-cs"/>
+              </a:defRPr>
+            </a:lvl3pPr>
+            <a:lvl4pPr marL="1600200" indent="-228600" algn="l" defTabSz="457200" rtl="0" eaLnBrk="1" latinLnBrk="0" hangingPunct="1">
+              <a:spcBef>
+                <a:spcPct val="20000"/>
+              </a:spcBef>
+              <a:spcAft>
+                <a:spcPts val="600"/>
+              </a:spcAft>
+              <a:buClr>
+                <a:schemeClr val="accent1"/>
+              </a:buClr>
+              <a:buFont typeface="Wingdings 2" charset="2"/>
+              <a:buChar char=""/>
+              <a:defRPr sz="1200" kern="1200">
+                <a:solidFill>
+                  <a:schemeClr val="tx1"/>
+                </a:solidFill>
+                <a:latin typeface="+mn-lt"/>
+                <a:ea typeface="+mn-ea"/>
+                <a:cs typeface="+mn-cs"/>
+              </a:defRPr>
+            </a:lvl4pPr>
+            <a:lvl5pPr marL="2057400" indent="-228600" algn="l" defTabSz="457200" rtl="0" eaLnBrk="1" latinLnBrk="0" hangingPunct="1">
+              <a:spcBef>
+                <a:spcPct val="20000"/>
+              </a:spcBef>
+              <a:spcAft>
+                <a:spcPts val="600"/>
+              </a:spcAft>
+              <a:buClr>
+                <a:schemeClr val="accent1"/>
+              </a:buClr>
+              <a:buFont typeface="Wingdings 2" charset="2"/>
+              <a:buChar char=""/>
+              <a:defRPr sz="1200" kern="1200">
+                <a:solidFill>
+                  <a:schemeClr val="tx1"/>
+                </a:solidFill>
+                <a:latin typeface="+mn-lt"/>
+                <a:ea typeface="+mn-ea"/>
+                <a:cs typeface="+mn-cs"/>
+              </a:defRPr>
+            </a:lvl5pPr>
+            <a:lvl6pPr marL="2400000" indent="-228600" algn="l" defTabSz="457200" rtl="0" eaLnBrk="1" latinLnBrk="0" hangingPunct="1">
+              <a:spcBef>
+                <a:spcPct val="20000"/>
+              </a:spcBef>
+              <a:spcAft>
+                <a:spcPts val="600"/>
+              </a:spcAft>
+              <a:buClr>
+                <a:schemeClr val="accent1"/>
+              </a:buClr>
+              <a:buFont typeface="Wingdings 2" charset="2"/>
+              <a:buChar char=""/>
+              <a:defRPr sz="1200" kern="1200">
+                <a:solidFill>
+                  <a:schemeClr val="tx1"/>
+                </a:solidFill>
+                <a:latin typeface="+mn-lt"/>
+                <a:ea typeface="+mn-ea"/>
+                <a:cs typeface="+mn-cs"/>
+              </a:defRPr>
+            </a:lvl6pPr>
+            <a:lvl7pPr marL="2800000" indent="-228600" algn="l" defTabSz="457200" rtl="0" eaLnBrk="1" latinLnBrk="0" hangingPunct="1">
+              <a:spcBef>
+                <a:spcPct val="20000"/>
+              </a:spcBef>
+              <a:spcAft>
+                <a:spcPts val="600"/>
+              </a:spcAft>
+              <a:buClr>
+                <a:schemeClr val="accent1"/>
+              </a:buClr>
+              <a:buFont typeface="Wingdings 2" charset="2"/>
+              <a:buChar char=""/>
+              <a:defRPr sz="1200" kern="1200">
+                <a:solidFill>
+                  <a:schemeClr val="tx1"/>
+                </a:solidFill>
+                <a:latin typeface="+mn-lt"/>
+                <a:ea typeface="+mn-ea"/>
+                <a:cs typeface="+mn-cs"/>
+              </a:defRPr>
+            </a:lvl7pPr>
+            <a:lvl8pPr marL="3200000" indent="-228600" algn="l" defTabSz="457200" rtl="0" eaLnBrk="1" latinLnBrk="0" hangingPunct="1">
+              <a:spcBef>
+                <a:spcPct val="20000"/>
+              </a:spcBef>
+              <a:spcAft>
+                <a:spcPts val="600"/>
+              </a:spcAft>
+              <a:buClr>
+                <a:schemeClr val="accent1"/>
+              </a:buClr>
+              <a:buFont typeface="Wingdings 2" charset="2"/>
+              <a:buChar char=""/>
+              <a:defRPr sz="1200" kern="1200">
+                <a:solidFill>
+                  <a:schemeClr val="tx1"/>
+                </a:solidFill>
+                <a:latin typeface="+mn-lt"/>
+                <a:ea typeface="+mn-ea"/>
+                <a:cs typeface="+mn-cs"/>
+              </a:defRPr>
+            </a:lvl8pPr>
+            <a:lvl9pPr marL="3600000" indent="-228600" algn="l" defTabSz="457200" rtl="0" eaLnBrk="1" latinLnBrk="0" hangingPunct="1">
+              <a:spcBef>
+                <a:spcPct val="20000"/>
+              </a:spcBef>
+              <a:spcAft>
+                <a:spcPts val="600"/>
+              </a:spcAft>
+              <a:buClr>
+                <a:schemeClr val="accent1"/>
+              </a:buClr>
+              <a:buFont typeface="Wingdings 2" charset="2"/>
+              <a:buChar char=""/>
+              <a:defRPr sz="1200" kern="1200">
+                <a:solidFill>
+                  <a:schemeClr val="tx1"/>
+                </a:solidFill>
+                <a:latin typeface="+mn-lt"/>
+                <a:ea typeface="+mn-ea"/>
+                <a:cs typeface="+mn-cs"/>
+              </a:defRPr>
+            </a:lvl9pPr>
+          </a:lstStyle>
+          <a:p>
+            <a:r>
+              <a:rPr lang="fr-FR" sz="1200" dirty="0" smtClean="0"/>
+              <a:t>Sphère : Créer une sphère de 360 degrés vide, c’est après manipulation de cette dernière qu’il est possible de lire une vidéo en VR.</a:t>
+            </a:r>
+          </a:p>
+          <a:p>
+            <a:r>
+              <a:rPr lang="fr-FR" sz="1200" dirty="0"/>
+              <a:t>Camera : Permet la manipulation axiale, vectorielle de la caméra permettant de lire la </a:t>
+            </a:r>
+            <a:r>
+              <a:rPr lang="fr-FR" sz="1200" dirty="0" smtClean="0"/>
+              <a:t>vidéo.</a:t>
+            </a:r>
+          </a:p>
+          <a:p>
+            <a:r>
+              <a:rPr lang="fr-FR" sz="1200" dirty="0" smtClean="0"/>
+              <a:t>Vidéo : Permet d’injecter la vidéo souhaité voir de la modifier/monter.</a:t>
+            </a:r>
+          </a:p>
+          <a:p>
+            <a:r>
+              <a:rPr lang="fr-FR" sz="1200" dirty="0" smtClean="0"/>
+              <a:t>Scènes : Permet de créer une scène fictive afin de simuler le rendu final de la vidéo.</a:t>
+            </a:r>
+          </a:p>
+          <a:p>
+            <a:r>
+              <a:rPr lang="fr-FR" sz="1200" dirty="0" smtClean="0"/>
+              <a:t>VR : Réalité virtuelle, l’outil principal permettant la lecture d’une vidéo à 360 degrés</a:t>
+            </a:r>
+          </a:p>
+          <a:p>
+            <a:r>
+              <a:rPr lang="fr-FR" sz="1200" dirty="0" smtClean="0"/>
+              <a:t>VR SDK : Permet de tester la VR directement via </a:t>
+            </a:r>
+            <a:r>
+              <a:rPr lang="fr-FR" sz="1200" dirty="0" err="1" smtClean="0"/>
+              <a:t>Unity</a:t>
+            </a:r>
+            <a:r>
+              <a:rPr lang="fr-FR" sz="1200" dirty="0" smtClean="0"/>
+              <a:t> en la simulant</a:t>
+            </a:r>
+          </a:p>
+          <a:p>
+            <a:endParaRPr lang="fr-FR" sz="1200" dirty="0" smtClean="0"/>
+          </a:p>
+          <a:p>
+            <a:endParaRPr lang="fr-FR" sz="1200" dirty="0"/>
+          </a:p>
+          <a:p>
+            <a:endParaRPr lang="fr-FR" dirty="0" smtClean="0"/>
+          </a:p>
+          <a:p>
+            <a:endParaRPr lang="fr-FR" dirty="0"/>
           </a:p>
         </p:txBody>
       </p:sp>
     </p:spTree>
     <p:extLst>
       <p:ext uri="{BB962C8B-B14F-4D97-AF65-F5344CB8AC3E}">
-        <p14:creationId xmlns:p14="http://schemas.microsoft.com/office/powerpoint/2010/main" val="935954564"/>
+        <p14:creationId xmlns:p14="http://schemas.microsoft.com/office/powerpoint/2010/main" val="957618485"/>
       </p:ext>
     </p:extLst>
   </p:cSld>
@@ -9085,6 +8978,412 @@
           <a:lstStyle/>
           <a:p>
             <a:r>
+              <a:rPr lang="fr-FR" dirty="0" smtClean="0"/>
+              <a:t>Problèmes rencontrés et solutions (4/4)</a:t>
+            </a:r>
+            <a:endParaRPr lang="fr-FR" dirty="0"/>
+          </a:p>
+        </p:txBody>
+      </p:sp>
+      <p:pic>
+        <p:nvPicPr>
+          <p:cNvPr id="4" name="Espace réservé du contenu 3"/>
+          <p:cNvPicPr>
+            <a:picLocks noGrp="1" noChangeAspect="1"/>
+          </p:cNvPicPr>
+          <p:nvPr>
+            <p:ph idx="1"/>
+          </p:nvPr>
+        </p:nvPicPr>
+        <p:blipFill>
+          <a:blip r:embed="rId2"/>
+          <a:stretch>
+            <a:fillRect/>
+          </a:stretch>
+        </p:blipFill>
+        <p:spPr>
+          <a:xfrm>
+            <a:off x="7914061" y="2608478"/>
+            <a:ext cx="3329946" cy="3925326"/>
+          </a:xfrm>
+          <a:prstGeom prst="rect">
+            <a:avLst/>
+          </a:prstGeom>
+        </p:spPr>
+      </p:pic>
+      <p:pic>
+        <p:nvPicPr>
+          <p:cNvPr id="1026" name="Picture 2" descr="RÃ©sultat de recherche d'images pour &quot;SphÃ©re x y z&quot;"/>
+          <p:cNvPicPr>
+            <a:picLocks noChangeAspect="1" noChangeArrowheads="1"/>
+          </p:cNvPicPr>
+          <p:nvPr/>
+        </p:nvPicPr>
+        <p:blipFill>
+          <a:blip r:embed="rId3">
+            <a:extLst>
+              <a:ext uri="{28A0092B-C50C-407E-A947-70E740481C1C}">
+                <a14:useLocalDpi xmlns:a14="http://schemas.microsoft.com/office/drawing/2010/main" val="0"/>
+              </a:ext>
+            </a:extLst>
+          </a:blip>
+          <a:srcRect/>
+          <a:stretch>
+            <a:fillRect/>
+          </a:stretch>
+        </p:blipFill>
+        <p:spPr bwMode="auto">
+          <a:xfrm>
+            <a:off x="3048406" y="3660033"/>
+            <a:ext cx="2038985" cy="1822216"/>
+          </a:xfrm>
+          <a:prstGeom prst="rect">
+            <a:avLst/>
+          </a:prstGeom>
+          <a:noFill/>
+          <a:extLst>
+            <a:ext uri="{909E8E84-426E-40DD-AFC4-6F175D3DCCD1}">
+              <a14:hiddenFill xmlns:a14="http://schemas.microsoft.com/office/drawing/2010/main">
+                <a:solidFill>
+                  <a:srgbClr val="FFFFFF"/>
+                </a:solidFill>
+              </a14:hiddenFill>
+            </a:ext>
+          </a:extLst>
+        </p:spPr>
+      </p:pic>
+      <p:sp>
+        <p:nvSpPr>
+          <p:cNvPr id="6" name="Flèche droite 5"/>
+          <p:cNvSpPr/>
+          <p:nvPr/>
+        </p:nvSpPr>
+        <p:spPr>
+          <a:xfrm>
+            <a:off x="5270269" y="4397432"/>
+            <a:ext cx="2493818" cy="191193"/>
+          </a:xfrm>
+          <a:prstGeom prst="rightArrow">
+            <a:avLst/>
+          </a:prstGeom>
+        </p:spPr>
+        <p:style>
+          <a:lnRef idx="2">
+            <a:schemeClr val="accent1">
+              <a:shade val="50000"/>
+            </a:schemeClr>
+          </a:lnRef>
+          <a:fillRef idx="1">
+            <a:schemeClr val="accent1"/>
+          </a:fillRef>
+          <a:effectRef idx="0">
+            <a:schemeClr val="accent1"/>
+          </a:effectRef>
+          <a:fontRef idx="minor">
+            <a:schemeClr val="lt1"/>
+          </a:fontRef>
+        </p:style>
+        <p:txBody>
+          <a:bodyPr rtlCol="0" anchor="ctr"/>
+          <a:lstStyle/>
+          <a:p>
+            <a:pPr algn="ctr"/>
+            <a:endParaRPr lang="fr-FR"/>
+          </a:p>
+        </p:txBody>
+      </p:sp>
+      <p:sp>
+        <p:nvSpPr>
+          <p:cNvPr id="9" name="Espace réservé du contenu 2"/>
+          <p:cNvSpPr txBox="1">
+            <a:spLocks/>
+          </p:cNvSpPr>
+          <p:nvPr/>
+        </p:nvSpPr>
+        <p:spPr>
+          <a:xfrm>
+            <a:off x="211883" y="1089280"/>
+            <a:ext cx="10554574" cy="3636511"/>
+          </a:xfrm>
+          <a:prstGeom prst="rect">
+            <a:avLst/>
+          </a:prstGeom>
+          <a:effectLst>
+            <a:outerShdw blurRad="50800" dir="14400000">
+              <a:srgbClr val="000000">
+                <a:alpha val="40000"/>
+              </a:srgbClr>
+            </a:outerShdw>
+          </a:effectLst>
+        </p:spPr>
+        <p:txBody>
+          <a:bodyPr vert="horz" lIns="91440" tIns="45720" rIns="91440" bIns="45720" rtlCol="0" anchor="ctr">
+            <a:normAutofit/>
+          </a:bodyPr>
+          <a:lstStyle>
+            <a:lvl1pPr marL="342900" indent="-342900" algn="l" defTabSz="457200" rtl="0" eaLnBrk="1" latinLnBrk="0" hangingPunct="1">
+              <a:spcBef>
+                <a:spcPct val="20000"/>
+              </a:spcBef>
+              <a:spcAft>
+                <a:spcPts val="600"/>
+              </a:spcAft>
+              <a:buClr>
+                <a:schemeClr val="accent1"/>
+              </a:buClr>
+              <a:buFont typeface="Wingdings 2" charset="2"/>
+              <a:buChar char=""/>
+              <a:defRPr sz="1800" kern="1200">
+                <a:solidFill>
+                  <a:schemeClr val="tx1"/>
+                </a:solidFill>
+                <a:latin typeface="+mn-lt"/>
+                <a:ea typeface="+mn-ea"/>
+                <a:cs typeface="+mn-cs"/>
+              </a:defRPr>
+            </a:lvl1pPr>
+            <a:lvl2pPr marL="742950" indent="-285750" algn="l" defTabSz="457200" rtl="0" eaLnBrk="1" latinLnBrk="0" hangingPunct="1">
+              <a:spcBef>
+                <a:spcPct val="20000"/>
+              </a:spcBef>
+              <a:spcAft>
+                <a:spcPts val="600"/>
+              </a:spcAft>
+              <a:buClr>
+                <a:schemeClr val="accent1"/>
+              </a:buClr>
+              <a:buFont typeface="Wingdings 2" charset="2"/>
+              <a:buChar char=""/>
+              <a:defRPr sz="1600" kern="1200">
+                <a:solidFill>
+                  <a:schemeClr val="tx1"/>
+                </a:solidFill>
+                <a:latin typeface="+mn-lt"/>
+                <a:ea typeface="+mn-ea"/>
+                <a:cs typeface="+mn-cs"/>
+              </a:defRPr>
+            </a:lvl2pPr>
+            <a:lvl3pPr marL="1143000" indent="-228600" algn="l" defTabSz="457200" rtl="0" eaLnBrk="1" latinLnBrk="0" hangingPunct="1">
+              <a:spcBef>
+                <a:spcPct val="20000"/>
+              </a:spcBef>
+              <a:spcAft>
+                <a:spcPts val="600"/>
+              </a:spcAft>
+              <a:buClr>
+                <a:schemeClr val="accent1"/>
+              </a:buClr>
+              <a:buFont typeface="Wingdings 2" charset="2"/>
+              <a:buChar char=""/>
+              <a:defRPr sz="1400" kern="1200">
+                <a:solidFill>
+                  <a:schemeClr val="tx1"/>
+                </a:solidFill>
+                <a:latin typeface="+mn-lt"/>
+                <a:ea typeface="+mn-ea"/>
+                <a:cs typeface="+mn-cs"/>
+              </a:defRPr>
+            </a:lvl3pPr>
+            <a:lvl4pPr marL="1600200" indent="-228600" algn="l" defTabSz="457200" rtl="0" eaLnBrk="1" latinLnBrk="0" hangingPunct="1">
+              <a:spcBef>
+                <a:spcPct val="20000"/>
+              </a:spcBef>
+              <a:spcAft>
+                <a:spcPts val="600"/>
+              </a:spcAft>
+              <a:buClr>
+                <a:schemeClr val="accent1"/>
+              </a:buClr>
+              <a:buFont typeface="Wingdings 2" charset="2"/>
+              <a:buChar char=""/>
+              <a:defRPr sz="1200" kern="1200">
+                <a:solidFill>
+                  <a:schemeClr val="tx1"/>
+                </a:solidFill>
+                <a:latin typeface="+mn-lt"/>
+                <a:ea typeface="+mn-ea"/>
+                <a:cs typeface="+mn-cs"/>
+              </a:defRPr>
+            </a:lvl4pPr>
+            <a:lvl5pPr marL="2057400" indent="-228600" algn="l" defTabSz="457200" rtl="0" eaLnBrk="1" latinLnBrk="0" hangingPunct="1">
+              <a:spcBef>
+                <a:spcPct val="20000"/>
+              </a:spcBef>
+              <a:spcAft>
+                <a:spcPts val="600"/>
+              </a:spcAft>
+              <a:buClr>
+                <a:schemeClr val="accent1"/>
+              </a:buClr>
+              <a:buFont typeface="Wingdings 2" charset="2"/>
+              <a:buChar char=""/>
+              <a:defRPr sz="1200" kern="1200">
+                <a:solidFill>
+                  <a:schemeClr val="tx1"/>
+                </a:solidFill>
+                <a:latin typeface="+mn-lt"/>
+                <a:ea typeface="+mn-ea"/>
+                <a:cs typeface="+mn-cs"/>
+              </a:defRPr>
+            </a:lvl5pPr>
+            <a:lvl6pPr marL="2400000" indent="-228600" algn="l" defTabSz="457200" rtl="0" eaLnBrk="1" latinLnBrk="0" hangingPunct="1">
+              <a:spcBef>
+                <a:spcPct val="20000"/>
+              </a:spcBef>
+              <a:spcAft>
+                <a:spcPts val="600"/>
+              </a:spcAft>
+              <a:buClr>
+                <a:schemeClr val="accent1"/>
+              </a:buClr>
+              <a:buFont typeface="Wingdings 2" charset="2"/>
+              <a:buChar char=""/>
+              <a:defRPr sz="1200" kern="1200">
+                <a:solidFill>
+                  <a:schemeClr val="tx1"/>
+                </a:solidFill>
+                <a:latin typeface="+mn-lt"/>
+                <a:ea typeface="+mn-ea"/>
+                <a:cs typeface="+mn-cs"/>
+              </a:defRPr>
+            </a:lvl6pPr>
+            <a:lvl7pPr marL="2800000" indent="-228600" algn="l" defTabSz="457200" rtl="0" eaLnBrk="1" latinLnBrk="0" hangingPunct="1">
+              <a:spcBef>
+                <a:spcPct val="20000"/>
+              </a:spcBef>
+              <a:spcAft>
+                <a:spcPts val="600"/>
+              </a:spcAft>
+              <a:buClr>
+                <a:schemeClr val="accent1"/>
+              </a:buClr>
+              <a:buFont typeface="Wingdings 2" charset="2"/>
+              <a:buChar char=""/>
+              <a:defRPr sz="1200" kern="1200">
+                <a:solidFill>
+                  <a:schemeClr val="tx1"/>
+                </a:solidFill>
+                <a:latin typeface="+mn-lt"/>
+                <a:ea typeface="+mn-ea"/>
+                <a:cs typeface="+mn-cs"/>
+              </a:defRPr>
+            </a:lvl7pPr>
+            <a:lvl8pPr marL="3200000" indent="-228600" algn="l" defTabSz="457200" rtl="0" eaLnBrk="1" latinLnBrk="0" hangingPunct="1">
+              <a:spcBef>
+                <a:spcPct val="20000"/>
+              </a:spcBef>
+              <a:spcAft>
+                <a:spcPts val="600"/>
+              </a:spcAft>
+              <a:buClr>
+                <a:schemeClr val="accent1"/>
+              </a:buClr>
+              <a:buFont typeface="Wingdings 2" charset="2"/>
+              <a:buChar char=""/>
+              <a:defRPr sz="1200" kern="1200">
+                <a:solidFill>
+                  <a:schemeClr val="tx1"/>
+                </a:solidFill>
+                <a:latin typeface="+mn-lt"/>
+                <a:ea typeface="+mn-ea"/>
+                <a:cs typeface="+mn-cs"/>
+              </a:defRPr>
+            </a:lvl8pPr>
+            <a:lvl9pPr marL="3600000" indent="-228600" algn="l" defTabSz="457200" rtl="0" eaLnBrk="1" latinLnBrk="0" hangingPunct="1">
+              <a:spcBef>
+                <a:spcPct val="20000"/>
+              </a:spcBef>
+              <a:spcAft>
+                <a:spcPts val="600"/>
+              </a:spcAft>
+              <a:buClr>
+                <a:schemeClr val="accent1"/>
+              </a:buClr>
+              <a:buFont typeface="Wingdings 2" charset="2"/>
+              <a:buChar char=""/>
+              <a:defRPr sz="1200" kern="1200">
+                <a:solidFill>
+                  <a:schemeClr val="tx1"/>
+                </a:solidFill>
+                <a:latin typeface="+mn-lt"/>
+                <a:ea typeface="+mn-ea"/>
+                <a:cs typeface="+mn-cs"/>
+              </a:defRPr>
+            </a:lvl9pPr>
+          </a:lstStyle>
+          <a:p>
+            <a:r>
+              <a:rPr lang="fr-FR" dirty="0" err="1" smtClean="0"/>
+              <a:t>Modeling</a:t>
+            </a:r>
+            <a:r>
+              <a:rPr lang="fr-FR" dirty="0" smtClean="0"/>
+              <a:t> vidéo inversée (problème d’axes et de vecteurs)</a:t>
+            </a:r>
+          </a:p>
+          <a:p>
+            <a:r>
+              <a:rPr lang="fr-FR" dirty="0" smtClean="0"/>
+              <a:t>Injection </a:t>
+            </a:r>
+            <a:r>
+              <a:rPr lang="fr-FR" dirty="0" err="1" smtClean="0"/>
+              <a:t>youtube</a:t>
+            </a:r>
+            <a:r>
+              <a:rPr lang="fr-FR" dirty="0" smtClean="0"/>
+              <a:t>.</a:t>
+            </a:r>
+            <a:endParaRPr lang="fr-FR" dirty="0"/>
+          </a:p>
+        </p:txBody>
+      </p:sp>
+    </p:spTree>
+    <p:extLst>
+      <p:ext uri="{BB962C8B-B14F-4D97-AF65-F5344CB8AC3E}">
+        <p14:creationId xmlns:p14="http://schemas.microsoft.com/office/powerpoint/2010/main" val="1750539296"/>
+      </p:ext>
+    </p:extLst>
+  </p:cSld>
+  <p:clrMapOvr>
+    <a:masterClrMapping/>
+  </p:clrMapOvr>
+</p:sld>
+</file>
+
+<file path=ppt/slides/slide26.xml><?xml version="1.0" encoding="utf-8"?>
+<p:sld xmlns:a="http://schemas.openxmlformats.org/drawingml/2006/main" xmlns:r="http://schemas.openxmlformats.org/officeDocument/2006/relationships" xmlns:p="http://schemas.openxmlformats.org/presentationml/2006/main">
+  <p:cSld>
+    <p:spTree>
+      <p:nvGrpSpPr>
+        <p:cNvPr id="1" name=""/>
+        <p:cNvGrpSpPr/>
+        <p:nvPr/>
+      </p:nvGrpSpPr>
+      <p:grpSpPr>
+        <a:xfrm>
+          <a:off x="0" y="0"/>
+          <a:ext cx="0" cy="0"/>
+          <a:chOff x="0" y="0"/>
+          <a:chExt cx="0" cy="0"/>
+        </a:xfrm>
+      </p:grpSpPr>
+      <p:sp>
+        <p:nvSpPr>
+          <p:cNvPr id="2" name="Titre 1"/>
+          <p:cNvSpPr>
+            <a:spLocks noGrp="1"/>
+          </p:cNvSpPr>
+          <p:nvPr>
+            <p:ph type="title"/>
+          </p:nvPr>
+        </p:nvSpPr>
+        <p:spPr/>
+        <p:txBody>
+          <a:bodyPr/>
+          <a:lstStyle/>
+          <a:p>
+            <a:r>
               <a:rPr lang="fr-FR" dirty="0"/>
               <a:t>Démo</a:t>
             </a:r>
@@ -9177,7 +9476,7 @@
 </p:sld>
 </file>
 
-<file path=ppt/slides/slide26.xml><?xml version="1.0" encoding="utf-8"?>
+<file path=ppt/slides/slide27.xml><?xml version="1.0" encoding="utf-8"?>
 <p:sld xmlns:a="http://schemas.openxmlformats.org/drawingml/2006/main" xmlns:r="http://schemas.openxmlformats.org/officeDocument/2006/relationships" xmlns:p="http://schemas.openxmlformats.org/presentationml/2006/main">
   <p:cSld>
     <p:spTree>

</xml_diff>